<commit_message>
demo pva with\ notes
</commit_message>
<xml_diff>
--- a/static/activities/activity-3.pptx
+++ b/static/activities/activity-3.pptx
@@ -228,7 +228,7 @@
           <a:p>
             <a:fld id="{39929DF8-621F-4458-9E67-C495A5AC4213}" type="datetimeFigureOut">
               <a:rPr lang="en-US" smtClean="0"/>
-              <a:t>12/11/2018</a:t>
+              <a:t>12/13/2018</a:t>
             </a:fld>
             <a:endParaRPr lang="en-US"/>
           </a:p>
@@ -648,8 +648,8 @@
         </p:nvSpPr>
         <p:spPr/>
       </p:sp>
-      <mc:AlternateContent xmlns:mc="http://schemas.openxmlformats.org/markup-compatibility/2006">
-        <mc:Choice xmlns:a14="http://schemas.microsoft.com/office/drawing/2010/main" Requires="a14">
+      <mc:AlternateContent xmlns:mc="http://schemas.openxmlformats.org/markup-compatibility/2006" xmlns:a14="http://schemas.microsoft.com/office/drawing/2010/main">
+        <mc:Choice Requires="a14">
           <p:sp>
             <p:nvSpPr>
               <p:cNvPr id="3" name="Notes Placeholder 2"/>
@@ -850,7 +850,7 @@
             </p:txBody>
           </p:sp>
         </mc:Choice>
-        <mc:Fallback>
+        <mc:Fallback xmlns="">
           <p:sp>
             <p:nvSpPr>
               <p:cNvPr id="3" name="Notes Placeholder 2"/>
@@ -1062,8 +1062,8 @@
         </p:nvSpPr>
         <p:spPr/>
       </p:sp>
-      <mc:AlternateContent xmlns:mc="http://schemas.openxmlformats.org/markup-compatibility/2006">
-        <mc:Choice xmlns:a14="http://schemas.microsoft.com/office/drawing/2010/main" Requires="a14">
+      <mc:AlternateContent xmlns:mc="http://schemas.openxmlformats.org/markup-compatibility/2006" xmlns:a14="http://schemas.microsoft.com/office/drawing/2010/main">
+        <mc:Choice Requires="a14">
           <p:sp>
             <p:nvSpPr>
               <p:cNvPr id="3" name="Notes Placeholder 2"/>
@@ -1264,7 +1264,7 @@
             </p:txBody>
           </p:sp>
         </mc:Choice>
-        <mc:Fallback>
+        <mc:Fallback xmlns="">
           <p:sp>
             <p:nvSpPr>
               <p:cNvPr id="3" name="Notes Placeholder 2"/>
@@ -1476,8 +1476,8 @@
         </p:nvSpPr>
         <p:spPr/>
       </p:sp>
-      <mc:AlternateContent xmlns:mc="http://schemas.openxmlformats.org/markup-compatibility/2006">
-        <mc:Choice xmlns:a14="http://schemas.microsoft.com/office/drawing/2010/main" Requires="a14">
+      <mc:AlternateContent xmlns:mc="http://schemas.openxmlformats.org/markup-compatibility/2006" xmlns:a14="http://schemas.microsoft.com/office/drawing/2010/main">
+        <mc:Choice Requires="a14">
           <p:sp>
             <p:nvSpPr>
               <p:cNvPr id="3" name="Notes Placeholder 2"/>
@@ -1678,7 +1678,7 @@
             </p:txBody>
           </p:sp>
         </mc:Choice>
-        <mc:Fallback>
+        <mc:Fallback xmlns="">
           <p:sp>
             <p:nvSpPr>
               <p:cNvPr id="3" name="Notes Placeholder 2"/>
@@ -2228,7 +2228,7 @@
           <a:p>
             <a:fld id="{E59C0860-C856-4592-9613-44A92B513991}" type="datetimeFigureOut">
               <a:rPr lang="en-US" smtClean="0"/>
-              <a:t>12/11/2018</a:t>
+              <a:t>12/13/2018</a:t>
             </a:fld>
             <a:endParaRPr lang="en-US"/>
           </a:p>
@@ -2452,7 +2452,7 @@
           <a:p>
             <a:fld id="{E59C0860-C856-4592-9613-44A92B513991}" type="datetimeFigureOut">
               <a:rPr lang="en-US" smtClean="0"/>
-              <a:t>12/11/2018</a:t>
+              <a:t>12/13/2018</a:t>
             </a:fld>
             <a:endParaRPr lang="en-US"/>
           </a:p>
@@ -2712,7 +2712,7 @@
           <a:p>
             <a:fld id="{589E5873-CF7F-45F3-B283-E59B1D6F242C}" type="datetimeFigureOut">
               <a:rPr lang="en-US" smtClean="0"/>
-              <a:t>12/11/2018</a:t>
+              <a:t>12/13/2018</a:t>
             </a:fld>
             <a:endParaRPr lang="en-US"/>
           </a:p>
@@ -2880,7 +2880,7 @@
           <a:p>
             <a:fld id="{589E5873-CF7F-45F3-B283-E59B1D6F242C}" type="datetimeFigureOut">
               <a:rPr lang="en-US" smtClean="0"/>
-              <a:t>12/11/2018</a:t>
+              <a:t>12/13/2018</a:t>
             </a:fld>
             <a:endParaRPr lang="en-US"/>
           </a:p>
@@ -3125,7 +3125,7 @@
           <a:p>
             <a:fld id="{589E5873-CF7F-45F3-B283-E59B1D6F242C}" type="datetimeFigureOut">
               <a:rPr lang="en-US" smtClean="0"/>
-              <a:t>12/11/2018</a:t>
+              <a:t>12/13/2018</a:t>
             </a:fld>
             <a:endParaRPr lang="en-US"/>
           </a:p>
@@ -3410,7 +3410,7 @@
           <a:p>
             <a:fld id="{589E5873-CF7F-45F3-B283-E59B1D6F242C}" type="datetimeFigureOut">
               <a:rPr lang="en-US" smtClean="0"/>
-              <a:t>12/11/2018</a:t>
+              <a:t>12/13/2018</a:t>
             </a:fld>
             <a:endParaRPr lang="en-US"/>
           </a:p>
@@ -3829,7 +3829,7 @@
           <a:p>
             <a:fld id="{589E5873-CF7F-45F3-B283-E59B1D6F242C}" type="datetimeFigureOut">
               <a:rPr lang="en-US" smtClean="0"/>
-              <a:t>12/11/2018</a:t>
+              <a:t>12/13/2018</a:t>
             </a:fld>
             <a:endParaRPr lang="en-US"/>
           </a:p>
@@ -3946,7 +3946,7 @@
           <a:p>
             <a:fld id="{589E5873-CF7F-45F3-B283-E59B1D6F242C}" type="datetimeFigureOut">
               <a:rPr lang="en-US" smtClean="0"/>
-              <a:t>12/11/2018</a:t>
+              <a:t>12/13/2018</a:t>
             </a:fld>
             <a:endParaRPr lang="en-US"/>
           </a:p>
@@ -4041,7 +4041,7 @@
           <a:p>
             <a:fld id="{589E5873-CF7F-45F3-B283-E59B1D6F242C}" type="datetimeFigureOut">
               <a:rPr lang="en-US" smtClean="0"/>
-              <a:t>12/11/2018</a:t>
+              <a:t>12/13/2018</a:t>
             </a:fld>
             <a:endParaRPr lang="en-US"/>
           </a:p>
@@ -4316,7 +4316,7 @@
           <a:p>
             <a:fld id="{589E5873-CF7F-45F3-B283-E59B1D6F242C}" type="datetimeFigureOut">
               <a:rPr lang="en-US" smtClean="0"/>
-              <a:t>12/11/2018</a:t>
+              <a:t>12/13/2018</a:t>
             </a:fld>
             <a:endParaRPr lang="en-US"/>
           </a:p>
@@ -4817,7 +4817,7 @@
           <a:p>
             <a:fld id="{589E5873-CF7F-45F3-B283-E59B1D6F242C}" type="datetimeFigureOut">
               <a:rPr lang="en-US" smtClean="0"/>
-              <a:t>12/11/2018</a:t>
+              <a:t>12/13/2018</a:t>
             </a:fld>
             <a:endParaRPr lang="en-US"/>
           </a:p>
@@ -4985,7 +4985,7 @@
           <a:p>
             <a:fld id="{589E5873-CF7F-45F3-B283-E59B1D6F242C}" type="datetimeFigureOut">
               <a:rPr lang="en-US" smtClean="0"/>
-              <a:t>12/11/2018</a:t>
+              <a:t>12/13/2018</a:t>
             </a:fld>
             <a:endParaRPr lang="en-US"/>
           </a:p>
@@ -5163,7 +5163,7 @@
           <a:p>
             <a:fld id="{589E5873-CF7F-45F3-B283-E59B1D6F242C}" type="datetimeFigureOut">
               <a:rPr lang="en-US" smtClean="0"/>
-              <a:t>12/11/2018</a:t>
+              <a:t>12/13/2018</a:t>
             </a:fld>
             <a:endParaRPr lang="en-US"/>
           </a:p>
@@ -5434,7 +5434,7 @@
           <a:p>
             <a:fld id="{E59C0860-C856-4592-9613-44A92B513991}" type="datetimeFigureOut">
               <a:rPr lang="en-US" smtClean="0"/>
-              <a:t>12/11/2018</a:t>
+              <a:t>12/13/2018</a:t>
             </a:fld>
             <a:endParaRPr lang="en-US"/>
           </a:p>
@@ -5715,7 +5715,7 @@
           <a:p>
             <a:fld id="{E59C0860-C856-4592-9613-44A92B513991}" type="datetimeFigureOut">
               <a:rPr lang="en-US" smtClean="0"/>
-              <a:t>12/11/2018</a:t>
+              <a:t>12/13/2018</a:t>
             </a:fld>
             <a:endParaRPr lang="en-US"/>
           </a:p>
@@ -6143,7 +6143,7 @@
           <a:p>
             <a:fld id="{E59C0860-C856-4592-9613-44A92B513991}" type="datetimeFigureOut">
               <a:rPr lang="en-US" smtClean="0"/>
-              <a:t>12/11/2018</a:t>
+              <a:t>12/13/2018</a:t>
             </a:fld>
             <a:endParaRPr lang="en-US"/>
           </a:p>
@@ -6300,7 +6300,7 @@
           <a:p>
             <a:fld id="{E59C0860-C856-4592-9613-44A92B513991}" type="datetimeFigureOut">
               <a:rPr lang="en-US" smtClean="0"/>
-              <a:t>12/11/2018</a:t>
+              <a:t>12/13/2018</a:t>
             </a:fld>
             <a:endParaRPr lang="en-US"/>
           </a:p>
@@ -6429,7 +6429,7 @@
           <a:p>
             <a:fld id="{E59C0860-C856-4592-9613-44A92B513991}" type="datetimeFigureOut">
               <a:rPr lang="en-US" smtClean="0"/>
-              <a:t>12/11/2018</a:t>
+              <a:t>12/13/2018</a:t>
             </a:fld>
             <a:endParaRPr lang="en-US"/>
           </a:p>
@@ -6756,7 +6756,7 @@
           <a:p>
             <a:fld id="{E59C0860-C856-4592-9613-44A92B513991}" type="datetimeFigureOut">
               <a:rPr lang="en-US" smtClean="0"/>
-              <a:t>12/11/2018</a:t>
+              <a:t>12/13/2018</a:t>
             </a:fld>
             <a:endParaRPr lang="en-US"/>
           </a:p>
@@ -7063,7 +7063,7 @@
           <a:p>
             <a:fld id="{E59C0860-C856-4592-9613-44A92B513991}" type="datetimeFigureOut">
               <a:rPr lang="en-US" smtClean="0"/>
-              <a:t>12/11/2018</a:t>
+              <a:t>12/13/2018</a:t>
             </a:fld>
             <a:endParaRPr lang="en-US"/>
           </a:p>
@@ -7861,7 +7861,7 @@
           <a:p>
             <a:fld id="{589E5873-CF7F-45F3-B283-E59B1D6F242C}" type="datetimeFigureOut">
               <a:rPr lang="en-US" smtClean="0"/>
-              <a:t>12/11/2018</a:t>
+              <a:t>12/13/2018</a:t>
             </a:fld>
             <a:endParaRPr lang="en-US"/>
           </a:p>
@@ -9747,12 +9747,20 @@
           <a:p>
             <a:pPr algn="ctr"/>
             <a:r>
+              <a:rPr lang="en-US" sz="2400">
+                <a:solidFill>
+                  <a:schemeClr val="tx1"/>
+                </a:solidFill>
+              </a:rPr>
+              <a:t>In 21% </a:t>
+            </a:r>
+            <a:r>
               <a:rPr lang="en-US" sz="2400" dirty="0">
                 <a:solidFill>
                   <a:schemeClr val="tx1"/>
                 </a:solidFill>
               </a:rPr>
-              <a:t>In 20% of the replications, all Coastal  populations ended in the Extirpated state</a:t>
+              <a:t>of the replications, all Coastal  populations ended in the Extirpated state</a:t>
             </a:r>
           </a:p>
         </p:txBody>
@@ -11099,8 +11107,8 @@
             </a:fontRef>
           </p:style>
         </p:cxnSp>
-        <mc:AlternateContent xmlns:mc="http://schemas.openxmlformats.org/markup-compatibility/2006">
-          <mc:Choice xmlns:a14="http://schemas.microsoft.com/office/drawing/2010/main" Requires="a14">
+        <mc:AlternateContent xmlns:mc="http://schemas.openxmlformats.org/markup-compatibility/2006" xmlns:a14="http://schemas.microsoft.com/office/drawing/2010/main">
+          <mc:Choice Requires="a14">
             <p:sp>
               <p:nvSpPr>
                 <p:cNvPr id="14" name="TextBox 13">
@@ -11169,7 +11177,7 @@
               </p:txBody>
             </p:sp>
           </mc:Choice>
-          <mc:Fallback>
+          <mc:Fallback xmlns="">
             <p:sp>
               <p:nvSpPr>
                 <p:cNvPr id="14" name="TextBox 13">
@@ -11214,8 +11222,8 @@
             </p:sp>
           </mc:Fallback>
         </mc:AlternateContent>
-        <mc:AlternateContent xmlns:mc="http://schemas.openxmlformats.org/markup-compatibility/2006">
-          <mc:Choice xmlns:a14="http://schemas.microsoft.com/office/drawing/2010/main" Requires="a14">
+        <mc:AlternateContent xmlns:mc="http://schemas.openxmlformats.org/markup-compatibility/2006" xmlns:a14="http://schemas.microsoft.com/office/drawing/2010/main">
+          <mc:Choice Requires="a14">
             <p:sp>
               <p:nvSpPr>
                 <p:cNvPr id="15" name="TextBox 14">
@@ -11284,7 +11292,7 @@
               </p:txBody>
             </p:sp>
           </mc:Choice>
-          <mc:Fallback>
+          <mc:Fallback xmlns="">
             <p:sp>
               <p:nvSpPr>
                 <p:cNvPr id="15" name="TextBox 14">
@@ -11329,8 +11337,8 @@
             </p:sp>
           </mc:Fallback>
         </mc:AlternateContent>
-        <mc:AlternateContent xmlns:mc="http://schemas.openxmlformats.org/markup-compatibility/2006">
-          <mc:Choice xmlns:a14="http://schemas.microsoft.com/office/drawing/2010/main" Requires="a14">
+        <mc:AlternateContent xmlns:mc="http://schemas.openxmlformats.org/markup-compatibility/2006" xmlns:a14="http://schemas.microsoft.com/office/drawing/2010/main">
+          <mc:Choice Requires="a14">
             <p:sp>
               <p:nvSpPr>
                 <p:cNvPr id="16" name="TextBox 15">
@@ -11399,7 +11407,7 @@
               </p:txBody>
             </p:sp>
           </mc:Choice>
-          <mc:Fallback>
+          <mc:Fallback xmlns="">
             <p:sp>
               <p:nvSpPr>
                 <p:cNvPr id="16" name="TextBox 15">
@@ -11444,8 +11452,8 @@
             </p:sp>
           </mc:Fallback>
         </mc:AlternateContent>
-        <mc:AlternateContent xmlns:mc="http://schemas.openxmlformats.org/markup-compatibility/2006">
-          <mc:Choice xmlns:a14="http://schemas.microsoft.com/office/drawing/2010/main" Requires="a14">
+        <mc:AlternateContent xmlns:mc="http://schemas.openxmlformats.org/markup-compatibility/2006" xmlns:a14="http://schemas.microsoft.com/office/drawing/2010/main">
+          <mc:Choice Requires="a14">
             <p:sp>
               <p:nvSpPr>
                 <p:cNvPr id="17" name="TextBox 16">
@@ -11514,7 +11522,7 @@
               </p:txBody>
             </p:sp>
           </mc:Choice>
-          <mc:Fallback>
+          <mc:Fallback xmlns="">
             <p:sp>
               <p:nvSpPr>
                 <p:cNvPr id="17" name="TextBox 16">
@@ -11559,8 +11567,8 @@
             </p:sp>
           </mc:Fallback>
         </mc:AlternateContent>
-        <mc:AlternateContent xmlns:mc="http://schemas.openxmlformats.org/markup-compatibility/2006">
-          <mc:Choice xmlns:a14="http://schemas.microsoft.com/office/drawing/2010/main" Requires="a14">
+        <mc:AlternateContent xmlns:mc="http://schemas.openxmlformats.org/markup-compatibility/2006" xmlns:a14="http://schemas.microsoft.com/office/drawing/2010/main">
+          <mc:Choice Requires="a14">
             <p:sp>
               <p:nvSpPr>
                 <p:cNvPr id="18" name="TextBox 17">
@@ -11629,7 +11637,7 @@
               </p:txBody>
             </p:sp>
           </mc:Choice>
-          <mc:Fallback>
+          <mc:Fallback xmlns="">
             <p:sp>
               <p:nvSpPr>
                 <p:cNvPr id="18" name="TextBox 17">
@@ -11825,8 +11833,8 @@
             </a:fontRef>
           </p:style>
         </p:cxnSp>
-        <mc:AlternateContent xmlns:mc="http://schemas.openxmlformats.org/markup-compatibility/2006">
-          <mc:Choice xmlns:a14="http://schemas.microsoft.com/office/drawing/2010/main" Requires="a14">
+        <mc:AlternateContent xmlns:mc="http://schemas.openxmlformats.org/markup-compatibility/2006" xmlns:a14="http://schemas.microsoft.com/office/drawing/2010/main">
+          <mc:Choice Requires="a14">
             <p:sp>
               <p:nvSpPr>
                 <p:cNvPr id="23" name="TextBox 22">
@@ -11895,7 +11903,7 @@
               </p:txBody>
             </p:sp>
           </mc:Choice>
-          <mc:Fallback>
+          <mc:Fallback xmlns="">
             <p:sp>
               <p:nvSpPr>
                 <p:cNvPr id="23" name="TextBox 22">
@@ -11940,8 +11948,8 @@
             </p:sp>
           </mc:Fallback>
         </mc:AlternateContent>
-        <mc:AlternateContent xmlns:mc="http://schemas.openxmlformats.org/markup-compatibility/2006">
-          <mc:Choice xmlns:a14="http://schemas.microsoft.com/office/drawing/2010/main" Requires="a14">
+        <mc:AlternateContent xmlns:mc="http://schemas.openxmlformats.org/markup-compatibility/2006" xmlns:a14="http://schemas.microsoft.com/office/drawing/2010/main">
+          <mc:Choice Requires="a14">
             <p:sp>
               <p:nvSpPr>
                 <p:cNvPr id="24" name="TextBox 23">
@@ -12010,7 +12018,7 @@
               </p:txBody>
             </p:sp>
           </mc:Choice>
-          <mc:Fallback>
+          <mc:Fallback xmlns="">
             <p:sp>
               <p:nvSpPr>
                 <p:cNvPr id="24" name="TextBox 23">
@@ -12055,8 +12063,8 @@
             </p:sp>
           </mc:Fallback>
         </mc:AlternateContent>
-        <mc:AlternateContent xmlns:mc="http://schemas.openxmlformats.org/markup-compatibility/2006">
-          <mc:Choice xmlns:a14="http://schemas.microsoft.com/office/drawing/2010/main" Requires="a14">
+        <mc:AlternateContent xmlns:mc="http://schemas.openxmlformats.org/markup-compatibility/2006" xmlns:a14="http://schemas.microsoft.com/office/drawing/2010/main">
+          <mc:Choice Requires="a14">
             <p:sp>
               <p:nvSpPr>
                 <p:cNvPr id="25" name="TextBox 24">
@@ -12125,7 +12133,7 @@
               </p:txBody>
             </p:sp>
           </mc:Choice>
-          <mc:Fallback>
+          <mc:Fallback xmlns="">
             <p:sp>
               <p:nvSpPr>
                 <p:cNvPr id="25" name="TextBox 24">
@@ -12696,8 +12704,8 @@
             </a:fontRef>
           </p:style>
         </p:cxnSp>
-        <mc:AlternateContent xmlns:mc="http://schemas.openxmlformats.org/markup-compatibility/2006">
-          <mc:Choice xmlns:a14="http://schemas.microsoft.com/office/drawing/2010/main" Requires="a14">
+        <mc:AlternateContent xmlns:mc="http://schemas.openxmlformats.org/markup-compatibility/2006" xmlns:a14="http://schemas.microsoft.com/office/drawing/2010/main">
+          <mc:Choice Requires="a14">
             <p:sp>
               <p:nvSpPr>
                 <p:cNvPr id="14" name="TextBox 13">
@@ -12766,7 +12774,7 @@
               </p:txBody>
             </p:sp>
           </mc:Choice>
-          <mc:Fallback>
+          <mc:Fallback xmlns="">
             <p:sp>
               <p:nvSpPr>
                 <p:cNvPr id="14" name="TextBox 13">
@@ -12811,8 +12819,8 @@
             </p:sp>
           </mc:Fallback>
         </mc:AlternateContent>
-        <mc:AlternateContent xmlns:mc="http://schemas.openxmlformats.org/markup-compatibility/2006">
-          <mc:Choice xmlns:a14="http://schemas.microsoft.com/office/drawing/2010/main" Requires="a14">
+        <mc:AlternateContent xmlns:mc="http://schemas.openxmlformats.org/markup-compatibility/2006" xmlns:a14="http://schemas.microsoft.com/office/drawing/2010/main">
+          <mc:Choice Requires="a14">
             <p:sp>
               <p:nvSpPr>
                 <p:cNvPr id="15" name="TextBox 14">
@@ -12881,7 +12889,7 @@
               </p:txBody>
             </p:sp>
           </mc:Choice>
-          <mc:Fallback>
+          <mc:Fallback xmlns="">
             <p:sp>
               <p:nvSpPr>
                 <p:cNvPr id="15" name="TextBox 14">
@@ -12926,8 +12934,8 @@
             </p:sp>
           </mc:Fallback>
         </mc:AlternateContent>
-        <mc:AlternateContent xmlns:mc="http://schemas.openxmlformats.org/markup-compatibility/2006">
-          <mc:Choice xmlns:a14="http://schemas.microsoft.com/office/drawing/2010/main" Requires="a14">
+        <mc:AlternateContent xmlns:mc="http://schemas.openxmlformats.org/markup-compatibility/2006" xmlns:a14="http://schemas.microsoft.com/office/drawing/2010/main">
+          <mc:Choice Requires="a14">
             <p:sp>
               <p:nvSpPr>
                 <p:cNvPr id="16" name="TextBox 15">
@@ -12996,7 +13004,7 @@
               </p:txBody>
             </p:sp>
           </mc:Choice>
-          <mc:Fallback>
+          <mc:Fallback xmlns="">
             <p:sp>
               <p:nvSpPr>
                 <p:cNvPr id="16" name="TextBox 15">
@@ -13041,8 +13049,8 @@
             </p:sp>
           </mc:Fallback>
         </mc:AlternateContent>
-        <mc:AlternateContent xmlns:mc="http://schemas.openxmlformats.org/markup-compatibility/2006">
-          <mc:Choice xmlns:a14="http://schemas.microsoft.com/office/drawing/2010/main" Requires="a14">
+        <mc:AlternateContent xmlns:mc="http://schemas.openxmlformats.org/markup-compatibility/2006" xmlns:a14="http://schemas.microsoft.com/office/drawing/2010/main">
+          <mc:Choice Requires="a14">
             <p:sp>
               <p:nvSpPr>
                 <p:cNvPr id="17" name="TextBox 16">
@@ -13111,7 +13119,7 @@
               </p:txBody>
             </p:sp>
           </mc:Choice>
-          <mc:Fallback>
+          <mc:Fallback xmlns="">
             <p:sp>
               <p:nvSpPr>
                 <p:cNvPr id="17" name="TextBox 16">
@@ -13156,8 +13164,8 @@
             </p:sp>
           </mc:Fallback>
         </mc:AlternateContent>
-        <mc:AlternateContent xmlns:mc="http://schemas.openxmlformats.org/markup-compatibility/2006">
-          <mc:Choice xmlns:a14="http://schemas.microsoft.com/office/drawing/2010/main" Requires="a14">
+        <mc:AlternateContent xmlns:mc="http://schemas.openxmlformats.org/markup-compatibility/2006" xmlns:a14="http://schemas.microsoft.com/office/drawing/2010/main">
+          <mc:Choice Requires="a14">
             <p:sp>
               <p:nvSpPr>
                 <p:cNvPr id="18" name="TextBox 17">
@@ -13226,7 +13234,7 @@
               </p:txBody>
             </p:sp>
           </mc:Choice>
-          <mc:Fallback>
+          <mc:Fallback xmlns="">
             <p:sp>
               <p:nvSpPr>
                 <p:cNvPr id="18" name="TextBox 17">
@@ -13422,8 +13430,8 @@
             </a:fontRef>
           </p:style>
         </p:cxnSp>
-        <mc:AlternateContent xmlns:mc="http://schemas.openxmlformats.org/markup-compatibility/2006">
-          <mc:Choice xmlns:a14="http://schemas.microsoft.com/office/drawing/2010/main" Requires="a14">
+        <mc:AlternateContent xmlns:mc="http://schemas.openxmlformats.org/markup-compatibility/2006" xmlns:a14="http://schemas.microsoft.com/office/drawing/2010/main">
+          <mc:Choice Requires="a14">
             <p:sp>
               <p:nvSpPr>
                 <p:cNvPr id="23" name="TextBox 22">
@@ -13492,7 +13500,7 @@
               </p:txBody>
             </p:sp>
           </mc:Choice>
-          <mc:Fallback>
+          <mc:Fallback xmlns="">
             <p:sp>
               <p:nvSpPr>
                 <p:cNvPr id="23" name="TextBox 22">
@@ -13537,8 +13545,8 @@
             </p:sp>
           </mc:Fallback>
         </mc:AlternateContent>
-        <mc:AlternateContent xmlns:mc="http://schemas.openxmlformats.org/markup-compatibility/2006">
-          <mc:Choice xmlns:a14="http://schemas.microsoft.com/office/drawing/2010/main" Requires="a14">
+        <mc:AlternateContent xmlns:mc="http://schemas.openxmlformats.org/markup-compatibility/2006" xmlns:a14="http://schemas.microsoft.com/office/drawing/2010/main">
+          <mc:Choice Requires="a14">
             <p:sp>
               <p:nvSpPr>
                 <p:cNvPr id="24" name="TextBox 23">
@@ -13607,7 +13615,7 @@
               </p:txBody>
             </p:sp>
           </mc:Choice>
-          <mc:Fallback>
+          <mc:Fallback xmlns="">
             <p:sp>
               <p:nvSpPr>
                 <p:cNvPr id="24" name="TextBox 23">
@@ -13652,8 +13660,8 @@
             </p:sp>
           </mc:Fallback>
         </mc:AlternateContent>
-        <mc:AlternateContent xmlns:mc="http://schemas.openxmlformats.org/markup-compatibility/2006">
-          <mc:Choice xmlns:a14="http://schemas.microsoft.com/office/drawing/2010/main" Requires="a14">
+        <mc:AlternateContent xmlns:mc="http://schemas.openxmlformats.org/markup-compatibility/2006" xmlns:a14="http://schemas.microsoft.com/office/drawing/2010/main">
+          <mc:Choice Requires="a14">
             <p:sp>
               <p:nvSpPr>
                 <p:cNvPr id="25" name="TextBox 24">
@@ -13722,7 +13730,7 @@
               </p:txBody>
             </p:sp>
           </mc:Choice>
-          <mc:Fallback>
+          <mc:Fallback xmlns="">
             <p:sp>
               <p:nvSpPr>
                 <p:cNvPr id="25" name="TextBox 24">
@@ -14200,8 +14208,8 @@
             </a:fontRef>
           </p:style>
         </p:cxnSp>
-        <mc:AlternateContent xmlns:mc="http://schemas.openxmlformats.org/markup-compatibility/2006">
-          <mc:Choice xmlns:a14="http://schemas.microsoft.com/office/drawing/2010/main" Requires="a14">
+        <mc:AlternateContent xmlns:mc="http://schemas.openxmlformats.org/markup-compatibility/2006" xmlns:a14="http://schemas.microsoft.com/office/drawing/2010/main">
+          <mc:Choice Requires="a14">
             <p:sp>
               <p:nvSpPr>
                 <p:cNvPr id="36" name="TextBox 35">
@@ -14270,7 +14278,7 @@
               </p:txBody>
             </p:sp>
           </mc:Choice>
-          <mc:Fallback>
+          <mc:Fallback xmlns="">
             <p:sp>
               <p:nvSpPr>
                 <p:cNvPr id="36" name="TextBox 35">
@@ -14315,8 +14323,8 @@
             </p:sp>
           </mc:Fallback>
         </mc:AlternateContent>
-        <mc:AlternateContent xmlns:mc="http://schemas.openxmlformats.org/markup-compatibility/2006">
-          <mc:Choice xmlns:a14="http://schemas.microsoft.com/office/drawing/2010/main" Requires="a14">
+        <mc:AlternateContent xmlns:mc="http://schemas.openxmlformats.org/markup-compatibility/2006" xmlns:a14="http://schemas.microsoft.com/office/drawing/2010/main">
+          <mc:Choice Requires="a14">
             <p:sp>
               <p:nvSpPr>
                 <p:cNvPr id="37" name="TextBox 36">
@@ -14385,7 +14393,7 @@
               </p:txBody>
             </p:sp>
           </mc:Choice>
-          <mc:Fallback>
+          <mc:Fallback xmlns="">
             <p:sp>
               <p:nvSpPr>
                 <p:cNvPr id="37" name="TextBox 36">
@@ -14430,8 +14438,8 @@
             </p:sp>
           </mc:Fallback>
         </mc:AlternateContent>
-        <mc:AlternateContent xmlns:mc="http://schemas.openxmlformats.org/markup-compatibility/2006">
-          <mc:Choice xmlns:a14="http://schemas.microsoft.com/office/drawing/2010/main" Requires="a14">
+        <mc:AlternateContent xmlns:mc="http://schemas.openxmlformats.org/markup-compatibility/2006" xmlns:a14="http://schemas.microsoft.com/office/drawing/2010/main">
+          <mc:Choice Requires="a14">
             <p:sp>
               <p:nvSpPr>
                 <p:cNvPr id="38" name="TextBox 37">
@@ -14500,7 +14508,7 @@
               </p:txBody>
             </p:sp>
           </mc:Choice>
-          <mc:Fallback>
+          <mc:Fallback xmlns="">
             <p:sp>
               <p:nvSpPr>
                 <p:cNvPr id="38" name="TextBox 37">
@@ -14545,8 +14553,8 @@
             </p:sp>
           </mc:Fallback>
         </mc:AlternateContent>
-        <mc:AlternateContent xmlns:mc="http://schemas.openxmlformats.org/markup-compatibility/2006">
-          <mc:Choice xmlns:a14="http://schemas.microsoft.com/office/drawing/2010/main" Requires="a14">
+        <mc:AlternateContent xmlns:mc="http://schemas.openxmlformats.org/markup-compatibility/2006" xmlns:a14="http://schemas.microsoft.com/office/drawing/2010/main">
+          <mc:Choice Requires="a14">
             <p:sp>
               <p:nvSpPr>
                 <p:cNvPr id="39" name="TextBox 38">
@@ -14615,7 +14623,7 @@
               </p:txBody>
             </p:sp>
           </mc:Choice>
-          <mc:Fallback>
+          <mc:Fallback xmlns="">
             <p:sp>
               <p:nvSpPr>
                 <p:cNvPr id="39" name="TextBox 38">
@@ -14660,8 +14668,8 @@
             </p:sp>
           </mc:Fallback>
         </mc:AlternateContent>
-        <mc:AlternateContent xmlns:mc="http://schemas.openxmlformats.org/markup-compatibility/2006">
-          <mc:Choice xmlns:a14="http://schemas.microsoft.com/office/drawing/2010/main" Requires="a14">
+        <mc:AlternateContent xmlns:mc="http://schemas.openxmlformats.org/markup-compatibility/2006" xmlns:a14="http://schemas.microsoft.com/office/drawing/2010/main">
+          <mc:Choice Requires="a14">
             <p:sp>
               <p:nvSpPr>
                 <p:cNvPr id="40" name="TextBox 39">
@@ -14730,7 +14738,7 @@
               </p:txBody>
             </p:sp>
           </mc:Choice>
-          <mc:Fallback>
+          <mc:Fallback xmlns="">
             <p:sp>
               <p:nvSpPr>
                 <p:cNvPr id="40" name="TextBox 39">
@@ -14926,8 +14934,8 @@
             </a:fontRef>
           </p:style>
         </p:cxnSp>
-        <mc:AlternateContent xmlns:mc="http://schemas.openxmlformats.org/markup-compatibility/2006">
-          <mc:Choice xmlns:a14="http://schemas.microsoft.com/office/drawing/2010/main" Requires="a14">
+        <mc:AlternateContent xmlns:mc="http://schemas.openxmlformats.org/markup-compatibility/2006" xmlns:a14="http://schemas.microsoft.com/office/drawing/2010/main">
+          <mc:Choice Requires="a14">
             <p:sp>
               <p:nvSpPr>
                 <p:cNvPr id="44" name="TextBox 43">
@@ -14996,7 +15004,7 @@
               </p:txBody>
             </p:sp>
           </mc:Choice>
-          <mc:Fallback>
+          <mc:Fallback xmlns="">
             <p:sp>
               <p:nvSpPr>
                 <p:cNvPr id="44" name="TextBox 43">
@@ -15041,8 +15049,8 @@
             </p:sp>
           </mc:Fallback>
         </mc:AlternateContent>
-        <mc:AlternateContent xmlns:mc="http://schemas.openxmlformats.org/markup-compatibility/2006">
-          <mc:Choice xmlns:a14="http://schemas.microsoft.com/office/drawing/2010/main" Requires="a14">
+        <mc:AlternateContent xmlns:mc="http://schemas.openxmlformats.org/markup-compatibility/2006" xmlns:a14="http://schemas.microsoft.com/office/drawing/2010/main">
+          <mc:Choice Requires="a14">
             <p:sp>
               <p:nvSpPr>
                 <p:cNvPr id="45" name="TextBox 44">
@@ -15111,7 +15119,7 @@
               </p:txBody>
             </p:sp>
           </mc:Choice>
-          <mc:Fallback>
+          <mc:Fallback xmlns="">
             <p:sp>
               <p:nvSpPr>
                 <p:cNvPr id="45" name="TextBox 44">
@@ -15156,8 +15164,8 @@
             </p:sp>
           </mc:Fallback>
         </mc:AlternateContent>
-        <mc:AlternateContent xmlns:mc="http://schemas.openxmlformats.org/markup-compatibility/2006">
-          <mc:Choice xmlns:a14="http://schemas.microsoft.com/office/drawing/2010/main" Requires="a14">
+        <mc:AlternateContent xmlns:mc="http://schemas.openxmlformats.org/markup-compatibility/2006" xmlns:a14="http://schemas.microsoft.com/office/drawing/2010/main">
+          <mc:Choice Requires="a14">
             <p:sp>
               <p:nvSpPr>
                 <p:cNvPr id="46" name="TextBox 45">
@@ -15226,7 +15234,7 @@
               </p:txBody>
             </p:sp>
           </mc:Choice>
-          <mc:Fallback>
+          <mc:Fallback xmlns="">
             <p:sp>
               <p:nvSpPr>
                 <p:cNvPr id="46" name="TextBox 45">
@@ -15869,8 +15877,8 @@
             </a:fontRef>
           </p:style>
         </p:cxnSp>
-        <mc:AlternateContent xmlns:mc="http://schemas.openxmlformats.org/markup-compatibility/2006">
-          <mc:Choice xmlns:a14="http://schemas.microsoft.com/office/drawing/2010/main" Requires="a14">
+        <mc:AlternateContent xmlns:mc="http://schemas.openxmlformats.org/markup-compatibility/2006" xmlns:a14="http://schemas.microsoft.com/office/drawing/2010/main">
+          <mc:Choice Requires="a14">
             <p:sp>
               <p:nvSpPr>
                 <p:cNvPr id="14" name="TextBox 13">
@@ -15939,7 +15947,7 @@
               </p:txBody>
             </p:sp>
           </mc:Choice>
-          <mc:Fallback>
+          <mc:Fallback xmlns="">
             <p:sp>
               <p:nvSpPr>
                 <p:cNvPr id="14" name="TextBox 13">
@@ -15984,8 +15992,8 @@
             </p:sp>
           </mc:Fallback>
         </mc:AlternateContent>
-        <mc:AlternateContent xmlns:mc="http://schemas.openxmlformats.org/markup-compatibility/2006">
-          <mc:Choice xmlns:a14="http://schemas.microsoft.com/office/drawing/2010/main" Requires="a14">
+        <mc:AlternateContent xmlns:mc="http://schemas.openxmlformats.org/markup-compatibility/2006" xmlns:a14="http://schemas.microsoft.com/office/drawing/2010/main">
+          <mc:Choice Requires="a14">
             <p:sp>
               <p:nvSpPr>
                 <p:cNvPr id="15" name="TextBox 14">
@@ -16054,7 +16062,7 @@
               </p:txBody>
             </p:sp>
           </mc:Choice>
-          <mc:Fallback>
+          <mc:Fallback xmlns="">
             <p:sp>
               <p:nvSpPr>
                 <p:cNvPr id="15" name="TextBox 14">
@@ -16099,8 +16107,8 @@
             </p:sp>
           </mc:Fallback>
         </mc:AlternateContent>
-        <mc:AlternateContent xmlns:mc="http://schemas.openxmlformats.org/markup-compatibility/2006">
-          <mc:Choice xmlns:a14="http://schemas.microsoft.com/office/drawing/2010/main" Requires="a14">
+        <mc:AlternateContent xmlns:mc="http://schemas.openxmlformats.org/markup-compatibility/2006" xmlns:a14="http://schemas.microsoft.com/office/drawing/2010/main">
+          <mc:Choice Requires="a14">
             <p:sp>
               <p:nvSpPr>
                 <p:cNvPr id="16" name="TextBox 15">
@@ -16169,7 +16177,7 @@
               </p:txBody>
             </p:sp>
           </mc:Choice>
-          <mc:Fallback>
+          <mc:Fallback xmlns="">
             <p:sp>
               <p:nvSpPr>
                 <p:cNvPr id="16" name="TextBox 15">
@@ -16214,8 +16222,8 @@
             </p:sp>
           </mc:Fallback>
         </mc:AlternateContent>
-        <mc:AlternateContent xmlns:mc="http://schemas.openxmlformats.org/markup-compatibility/2006">
-          <mc:Choice xmlns:a14="http://schemas.microsoft.com/office/drawing/2010/main" Requires="a14">
+        <mc:AlternateContent xmlns:mc="http://schemas.openxmlformats.org/markup-compatibility/2006" xmlns:a14="http://schemas.microsoft.com/office/drawing/2010/main">
+          <mc:Choice Requires="a14">
             <p:sp>
               <p:nvSpPr>
                 <p:cNvPr id="17" name="TextBox 16">
@@ -16284,7 +16292,7 @@
               </p:txBody>
             </p:sp>
           </mc:Choice>
-          <mc:Fallback>
+          <mc:Fallback xmlns="">
             <p:sp>
               <p:nvSpPr>
                 <p:cNvPr id="17" name="TextBox 16">
@@ -16329,8 +16337,8 @@
             </p:sp>
           </mc:Fallback>
         </mc:AlternateContent>
-        <mc:AlternateContent xmlns:mc="http://schemas.openxmlformats.org/markup-compatibility/2006">
-          <mc:Choice xmlns:a14="http://schemas.microsoft.com/office/drawing/2010/main" Requires="a14">
+        <mc:AlternateContent xmlns:mc="http://schemas.openxmlformats.org/markup-compatibility/2006" xmlns:a14="http://schemas.microsoft.com/office/drawing/2010/main">
+          <mc:Choice Requires="a14">
             <p:sp>
               <p:nvSpPr>
                 <p:cNvPr id="18" name="TextBox 17">
@@ -16399,7 +16407,7 @@
               </p:txBody>
             </p:sp>
           </mc:Choice>
-          <mc:Fallback>
+          <mc:Fallback xmlns="">
             <p:sp>
               <p:nvSpPr>
                 <p:cNvPr id="18" name="TextBox 17">
@@ -16595,8 +16603,8 @@
             </a:fontRef>
           </p:style>
         </p:cxnSp>
-        <mc:AlternateContent xmlns:mc="http://schemas.openxmlformats.org/markup-compatibility/2006">
-          <mc:Choice xmlns:a14="http://schemas.microsoft.com/office/drawing/2010/main" Requires="a14">
+        <mc:AlternateContent xmlns:mc="http://schemas.openxmlformats.org/markup-compatibility/2006" xmlns:a14="http://schemas.microsoft.com/office/drawing/2010/main">
+          <mc:Choice Requires="a14">
             <p:sp>
               <p:nvSpPr>
                 <p:cNvPr id="23" name="TextBox 22">
@@ -16665,7 +16673,7 @@
               </p:txBody>
             </p:sp>
           </mc:Choice>
-          <mc:Fallback>
+          <mc:Fallback xmlns="">
             <p:sp>
               <p:nvSpPr>
                 <p:cNvPr id="23" name="TextBox 22">
@@ -16710,8 +16718,8 @@
             </p:sp>
           </mc:Fallback>
         </mc:AlternateContent>
-        <mc:AlternateContent xmlns:mc="http://schemas.openxmlformats.org/markup-compatibility/2006">
-          <mc:Choice xmlns:a14="http://schemas.microsoft.com/office/drawing/2010/main" Requires="a14">
+        <mc:AlternateContent xmlns:mc="http://schemas.openxmlformats.org/markup-compatibility/2006" xmlns:a14="http://schemas.microsoft.com/office/drawing/2010/main">
+          <mc:Choice Requires="a14">
             <p:sp>
               <p:nvSpPr>
                 <p:cNvPr id="24" name="TextBox 23">
@@ -16780,7 +16788,7 @@
               </p:txBody>
             </p:sp>
           </mc:Choice>
-          <mc:Fallback>
+          <mc:Fallback xmlns="">
             <p:sp>
               <p:nvSpPr>
                 <p:cNvPr id="24" name="TextBox 23">
@@ -16825,8 +16833,8 @@
             </p:sp>
           </mc:Fallback>
         </mc:AlternateContent>
-        <mc:AlternateContent xmlns:mc="http://schemas.openxmlformats.org/markup-compatibility/2006">
-          <mc:Choice xmlns:a14="http://schemas.microsoft.com/office/drawing/2010/main" Requires="a14">
+        <mc:AlternateContent xmlns:mc="http://schemas.openxmlformats.org/markup-compatibility/2006" xmlns:a14="http://schemas.microsoft.com/office/drawing/2010/main">
+          <mc:Choice Requires="a14">
             <p:sp>
               <p:nvSpPr>
                 <p:cNvPr id="25" name="TextBox 24">
@@ -16895,7 +16903,7 @@
               </p:txBody>
             </p:sp>
           </mc:Choice>
-          <mc:Fallback>
+          <mc:Fallback xmlns="">
             <p:sp>
               <p:nvSpPr>
                 <p:cNvPr id="25" name="TextBox 24">
@@ -17480,8 +17488,8 @@
             </a:fontRef>
           </p:style>
         </p:cxnSp>
-        <mc:AlternateContent xmlns:mc="http://schemas.openxmlformats.org/markup-compatibility/2006">
-          <mc:Choice xmlns:a14="http://schemas.microsoft.com/office/drawing/2010/main" Requires="a14">
+        <mc:AlternateContent xmlns:mc="http://schemas.openxmlformats.org/markup-compatibility/2006" xmlns:a14="http://schemas.microsoft.com/office/drawing/2010/main">
+          <mc:Choice Requires="a14">
             <p:sp>
               <p:nvSpPr>
                 <p:cNvPr id="57" name="TextBox 56">
@@ -17550,7 +17558,7 @@
               </p:txBody>
             </p:sp>
           </mc:Choice>
-          <mc:Fallback>
+          <mc:Fallback xmlns="">
             <p:sp>
               <p:nvSpPr>
                 <p:cNvPr id="57" name="TextBox 56">
@@ -17595,8 +17603,8 @@
             </p:sp>
           </mc:Fallback>
         </mc:AlternateContent>
-        <mc:AlternateContent xmlns:mc="http://schemas.openxmlformats.org/markup-compatibility/2006">
-          <mc:Choice xmlns:a14="http://schemas.microsoft.com/office/drawing/2010/main" Requires="a14">
+        <mc:AlternateContent xmlns:mc="http://schemas.openxmlformats.org/markup-compatibility/2006" xmlns:a14="http://schemas.microsoft.com/office/drawing/2010/main">
+          <mc:Choice Requires="a14">
             <p:sp>
               <p:nvSpPr>
                 <p:cNvPr id="58" name="TextBox 57">
@@ -17665,7 +17673,7 @@
               </p:txBody>
             </p:sp>
           </mc:Choice>
-          <mc:Fallback>
+          <mc:Fallback xmlns="">
             <p:sp>
               <p:nvSpPr>
                 <p:cNvPr id="58" name="TextBox 57">
@@ -17710,8 +17718,8 @@
             </p:sp>
           </mc:Fallback>
         </mc:AlternateContent>
-        <mc:AlternateContent xmlns:mc="http://schemas.openxmlformats.org/markup-compatibility/2006">
-          <mc:Choice xmlns:a14="http://schemas.microsoft.com/office/drawing/2010/main" Requires="a14">
+        <mc:AlternateContent xmlns:mc="http://schemas.openxmlformats.org/markup-compatibility/2006" xmlns:a14="http://schemas.microsoft.com/office/drawing/2010/main">
+          <mc:Choice Requires="a14">
             <p:sp>
               <p:nvSpPr>
                 <p:cNvPr id="59" name="TextBox 58">
@@ -17780,7 +17788,7 @@
               </p:txBody>
             </p:sp>
           </mc:Choice>
-          <mc:Fallback>
+          <mc:Fallback xmlns="">
             <p:sp>
               <p:nvSpPr>
                 <p:cNvPr id="59" name="TextBox 58">
@@ -17825,8 +17833,8 @@
             </p:sp>
           </mc:Fallback>
         </mc:AlternateContent>
-        <mc:AlternateContent xmlns:mc="http://schemas.openxmlformats.org/markup-compatibility/2006">
-          <mc:Choice xmlns:a14="http://schemas.microsoft.com/office/drawing/2010/main" Requires="a14">
+        <mc:AlternateContent xmlns:mc="http://schemas.openxmlformats.org/markup-compatibility/2006" xmlns:a14="http://schemas.microsoft.com/office/drawing/2010/main">
+          <mc:Choice Requires="a14">
             <p:sp>
               <p:nvSpPr>
                 <p:cNvPr id="60" name="TextBox 59">
@@ -17895,7 +17903,7 @@
               </p:txBody>
             </p:sp>
           </mc:Choice>
-          <mc:Fallback>
+          <mc:Fallback xmlns="">
             <p:sp>
               <p:nvSpPr>
                 <p:cNvPr id="60" name="TextBox 59">
@@ -17940,8 +17948,8 @@
             </p:sp>
           </mc:Fallback>
         </mc:AlternateContent>
-        <mc:AlternateContent xmlns:mc="http://schemas.openxmlformats.org/markup-compatibility/2006">
-          <mc:Choice xmlns:a14="http://schemas.microsoft.com/office/drawing/2010/main" Requires="a14">
+        <mc:AlternateContent xmlns:mc="http://schemas.openxmlformats.org/markup-compatibility/2006" xmlns:a14="http://schemas.microsoft.com/office/drawing/2010/main">
+          <mc:Choice Requires="a14">
             <p:sp>
               <p:nvSpPr>
                 <p:cNvPr id="61" name="TextBox 60">
@@ -18010,7 +18018,7 @@
               </p:txBody>
             </p:sp>
           </mc:Choice>
-          <mc:Fallback>
+          <mc:Fallback xmlns="">
             <p:sp>
               <p:nvSpPr>
                 <p:cNvPr id="61" name="TextBox 60">
@@ -18206,8 +18214,8 @@
             </a:fontRef>
           </p:style>
         </p:cxnSp>
-        <mc:AlternateContent xmlns:mc="http://schemas.openxmlformats.org/markup-compatibility/2006">
-          <mc:Choice xmlns:a14="http://schemas.microsoft.com/office/drawing/2010/main" Requires="a14">
+        <mc:AlternateContent xmlns:mc="http://schemas.openxmlformats.org/markup-compatibility/2006" xmlns:a14="http://schemas.microsoft.com/office/drawing/2010/main">
+          <mc:Choice Requires="a14">
             <p:sp>
               <p:nvSpPr>
                 <p:cNvPr id="65" name="TextBox 64">
@@ -18276,7 +18284,7 @@
               </p:txBody>
             </p:sp>
           </mc:Choice>
-          <mc:Fallback>
+          <mc:Fallback xmlns="">
             <p:sp>
               <p:nvSpPr>
                 <p:cNvPr id="65" name="TextBox 64">
@@ -18321,8 +18329,8 @@
             </p:sp>
           </mc:Fallback>
         </mc:AlternateContent>
-        <mc:AlternateContent xmlns:mc="http://schemas.openxmlformats.org/markup-compatibility/2006">
-          <mc:Choice xmlns:a14="http://schemas.microsoft.com/office/drawing/2010/main" Requires="a14">
+        <mc:AlternateContent xmlns:mc="http://schemas.openxmlformats.org/markup-compatibility/2006" xmlns:a14="http://schemas.microsoft.com/office/drawing/2010/main">
+          <mc:Choice Requires="a14">
             <p:sp>
               <p:nvSpPr>
                 <p:cNvPr id="66" name="TextBox 65">
@@ -18391,7 +18399,7 @@
               </p:txBody>
             </p:sp>
           </mc:Choice>
-          <mc:Fallback>
+          <mc:Fallback xmlns="">
             <p:sp>
               <p:nvSpPr>
                 <p:cNvPr id="66" name="TextBox 65">
@@ -18436,8 +18444,8 @@
             </p:sp>
           </mc:Fallback>
         </mc:AlternateContent>
-        <mc:AlternateContent xmlns:mc="http://schemas.openxmlformats.org/markup-compatibility/2006">
-          <mc:Choice xmlns:a14="http://schemas.microsoft.com/office/drawing/2010/main" Requires="a14">
+        <mc:AlternateContent xmlns:mc="http://schemas.openxmlformats.org/markup-compatibility/2006" xmlns:a14="http://schemas.microsoft.com/office/drawing/2010/main">
+          <mc:Choice Requires="a14">
             <p:sp>
               <p:nvSpPr>
                 <p:cNvPr id="67" name="TextBox 66">
@@ -18506,7 +18514,7 @@
               </p:txBody>
             </p:sp>
           </mc:Choice>
-          <mc:Fallback>
+          <mc:Fallback xmlns="">
             <p:sp>
               <p:nvSpPr>
                 <p:cNvPr id="67" name="TextBox 66">

</xml_diff>

<commit_message>
activity updates - added page numbers
</commit_message>
<xml_diff>
--- a/static/activities/activity-3.pptx
+++ b/static/activities/activity-3.pptx
@@ -6,7 +6,7 @@
     <p:sldMasterId id="2147483672" r:id="rId2"/>
   </p:sldMasterIdLst>
   <p:notesMasterIdLst>
-    <p:notesMasterId r:id="rId23"/>
+    <p:notesMasterId r:id="rId25"/>
   </p:notesMasterIdLst>
   <p:sldIdLst>
     <p:sldId id="277" r:id="rId3"/>
@@ -20,15 +20,17 @@
     <p:sldId id="272" r:id="rId11"/>
     <p:sldId id="273" r:id="rId12"/>
     <p:sldId id="262" r:id="rId13"/>
-    <p:sldId id="264" r:id="rId14"/>
-    <p:sldId id="274" r:id="rId15"/>
-    <p:sldId id="265" r:id="rId16"/>
-    <p:sldId id="275" r:id="rId17"/>
-    <p:sldId id="276" r:id="rId18"/>
-    <p:sldId id="266" r:id="rId19"/>
-    <p:sldId id="267" r:id="rId20"/>
-    <p:sldId id="268" r:id="rId21"/>
-    <p:sldId id="270" r:id="rId22"/>
+    <p:sldId id="278" r:id="rId14"/>
+    <p:sldId id="264" r:id="rId15"/>
+    <p:sldId id="279" r:id="rId16"/>
+    <p:sldId id="274" r:id="rId17"/>
+    <p:sldId id="265" r:id="rId18"/>
+    <p:sldId id="275" r:id="rId19"/>
+    <p:sldId id="276" r:id="rId20"/>
+    <p:sldId id="266" r:id="rId21"/>
+    <p:sldId id="267" r:id="rId22"/>
+    <p:sldId id="268" r:id="rId23"/>
+    <p:sldId id="270" r:id="rId24"/>
   </p:sldIdLst>
   <p:sldSz cx="12192000" cy="6858000"/>
   <p:notesSz cx="6858000" cy="9144000"/>
@@ -228,7 +230,7 @@
           <a:p>
             <a:fld id="{39929DF8-621F-4458-9E67-C495A5AC4213}" type="datetimeFigureOut">
               <a:rPr lang="en-US" smtClean="0"/>
-              <a:t>10/18/2019</a:t>
+              <a:t>11/26/2019</a:t>
             </a:fld>
             <a:endParaRPr lang="en-US"/>
           </a:p>
@@ -600,7 +602,7 @@
           <a:p>
             <a:fld id="{D2EEB552-27C5-4AF6-B8C3-0A7F981AD9FC}" type="slidenum">
               <a:rPr lang="en-US" smtClean="0"/>
-              <a:t>13</a:t>
+              <a:t>15</a:t>
             </a:fld>
             <a:endParaRPr lang="en-US"/>
           </a:p>
@@ -1014,7 +1016,7 @@
           <a:p>
             <a:fld id="{D2EEB552-27C5-4AF6-B8C3-0A7F981AD9FC}" type="slidenum">
               <a:rPr lang="en-US" smtClean="0"/>
-              <a:t>14</a:t>
+              <a:t>16</a:t>
             </a:fld>
             <a:endParaRPr lang="en-US"/>
           </a:p>
@@ -1428,7 +1430,7 @@
           <a:p>
             <a:fld id="{D2EEB552-27C5-4AF6-B8C3-0A7F981AD9FC}" type="slidenum">
               <a:rPr lang="en-US" smtClean="0"/>
-              <a:t>15</a:t>
+              <a:t>17</a:t>
             </a:fld>
             <a:endParaRPr lang="en-US"/>
           </a:p>
@@ -1842,7 +1844,7 @@
           <a:p>
             <a:fld id="{D2EEB552-27C5-4AF6-B8C3-0A7F981AD9FC}" type="slidenum">
               <a:rPr lang="en-US" smtClean="0"/>
-              <a:t>16</a:t>
+              <a:t>18</a:t>
             </a:fld>
             <a:endParaRPr lang="en-US"/>
           </a:p>
@@ -2228,7 +2230,7 @@
           <a:p>
             <a:fld id="{E59C0860-C856-4592-9613-44A92B513991}" type="datetimeFigureOut">
               <a:rPr lang="en-US" smtClean="0"/>
-              <a:t>10/18/2019</a:t>
+              <a:t>11/26/2019</a:t>
             </a:fld>
             <a:endParaRPr lang="en-US"/>
           </a:p>
@@ -2452,7 +2454,7 @@
           <a:p>
             <a:fld id="{E59C0860-C856-4592-9613-44A92B513991}" type="datetimeFigureOut">
               <a:rPr lang="en-US" smtClean="0"/>
-              <a:t>10/18/2019</a:t>
+              <a:t>11/26/2019</a:t>
             </a:fld>
             <a:endParaRPr lang="en-US"/>
           </a:p>
@@ -2712,7 +2714,7 @@
           <a:p>
             <a:fld id="{589E5873-CF7F-45F3-B283-E59B1D6F242C}" type="datetimeFigureOut">
               <a:rPr lang="en-US" smtClean="0"/>
-              <a:t>10/18/2019</a:t>
+              <a:t>11/26/2019</a:t>
             </a:fld>
             <a:endParaRPr lang="en-US"/>
           </a:p>
@@ -2880,7 +2882,7 @@
           <a:p>
             <a:fld id="{589E5873-CF7F-45F3-B283-E59B1D6F242C}" type="datetimeFigureOut">
               <a:rPr lang="en-US" smtClean="0"/>
-              <a:t>10/18/2019</a:t>
+              <a:t>11/26/2019</a:t>
             </a:fld>
             <a:endParaRPr lang="en-US"/>
           </a:p>
@@ -3125,7 +3127,7 @@
           <a:p>
             <a:fld id="{589E5873-CF7F-45F3-B283-E59B1D6F242C}" type="datetimeFigureOut">
               <a:rPr lang="en-US" smtClean="0"/>
-              <a:t>10/18/2019</a:t>
+              <a:t>11/26/2019</a:t>
             </a:fld>
             <a:endParaRPr lang="en-US"/>
           </a:p>
@@ -3410,7 +3412,7 @@
           <a:p>
             <a:fld id="{589E5873-CF7F-45F3-B283-E59B1D6F242C}" type="datetimeFigureOut">
               <a:rPr lang="en-US" smtClean="0"/>
-              <a:t>10/18/2019</a:t>
+              <a:t>11/26/2019</a:t>
             </a:fld>
             <a:endParaRPr lang="en-US"/>
           </a:p>
@@ -3829,7 +3831,7 @@
           <a:p>
             <a:fld id="{589E5873-CF7F-45F3-B283-E59B1D6F242C}" type="datetimeFigureOut">
               <a:rPr lang="en-US" smtClean="0"/>
-              <a:t>10/18/2019</a:t>
+              <a:t>11/26/2019</a:t>
             </a:fld>
             <a:endParaRPr lang="en-US"/>
           </a:p>
@@ -3946,7 +3948,7 @@
           <a:p>
             <a:fld id="{589E5873-CF7F-45F3-B283-E59B1D6F242C}" type="datetimeFigureOut">
               <a:rPr lang="en-US" smtClean="0"/>
-              <a:t>10/18/2019</a:t>
+              <a:t>11/26/2019</a:t>
             </a:fld>
             <a:endParaRPr lang="en-US"/>
           </a:p>
@@ -4041,7 +4043,7 @@
           <a:p>
             <a:fld id="{589E5873-CF7F-45F3-B283-E59B1D6F242C}" type="datetimeFigureOut">
               <a:rPr lang="en-US" smtClean="0"/>
-              <a:t>10/18/2019</a:t>
+              <a:t>11/26/2019</a:t>
             </a:fld>
             <a:endParaRPr lang="en-US"/>
           </a:p>
@@ -4316,7 +4318,7 @@
           <a:p>
             <a:fld id="{589E5873-CF7F-45F3-B283-E59B1D6F242C}" type="datetimeFigureOut">
               <a:rPr lang="en-US" smtClean="0"/>
-              <a:t>10/18/2019</a:t>
+              <a:t>11/26/2019</a:t>
             </a:fld>
             <a:endParaRPr lang="en-US"/>
           </a:p>
@@ -4817,7 +4819,7 @@
           <a:p>
             <a:fld id="{589E5873-CF7F-45F3-B283-E59B1D6F242C}" type="datetimeFigureOut">
               <a:rPr lang="en-US" smtClean="0"/>
-              <a:t>10/18/2019</a:t>
+              <a:t>11/26/2019</a:t>
             </a:fld>
             <a:endParaRPr lang="en-US"/>
           </a:p>
@@ -4985,7 +4987,7 @@
           <a:p>
             <a:fld id="{589E5873-CF7F-45F3-B283-E59B1D6F242C}" type="datetimeFigureOut">
               <a:rPr lang="en-US" smtClean="0"/>
-              <a:t>10/18/2019</a:t>
+              <a:t>11/26/2019</a:t>
             </a:fld>
             <a:endParaRPr lang="en-US"/>
           </a:p>
@@ -5163,7 +5165,7 @@
           <a:p>
             <a:fld id="{589E5873-CF7F-45F3-B283-E59B1D6F242C}" type="datetimeFigureOut">
               <a:rPr lang="en-US" smtClean="0"/>
-              <a:t>10/18/2019</a:t>
+              <a:t>11/26/2019</a:t>
             </a:fld>
             <a:endParaRPr lang="en-US"/>
           </a:p>
@@ -5434,7 +5436,7 @@
           <a:p>
             <a:fld id="{E59C0860-C856-4592-9613-44A92B513991}" type="datetimeFigureOut">
               <a:rPr lang="en-US" smtClean="0"/>
-              <a:t>10/18/2019</a:t>
+              <a:t>11/26/2019</a:t>
             </a:fld>
             <a:endParaRPr lang="en-US"/>
           </a:p>
@@ -5715,7 +5717,7 @@
           <a:p>
             <a:fld id="{E59C0860-C856-4592-9613-44A92B513991}" type="datetimeFigureOut">
               <a:rPr lang="en-US" smtClean="0"/>
-              <a:t>10/18/2019</a:t>
+              <a:t>11/26/2019</a:t>
             </a:fld>
             <a:endParaRPr lang="en-US"/>
           </a:p>
@@ -6143,7 +6145,7 @@
           <a:p>
             <a:fld id="{E59C0860-C856-4592-9613-44A92B513991}" type="datetimeFigureOut">
               <a:rPr lang="en-US" smtClean="0"/>
-              <a:t>10/18/2019</a:t>
+              <a:t>11/26/2019</a:t>
             </a:fld>
             <a:endParaRPr lang="en-US"/>
           </a:p>
@@ -6300,7 +6302,7 @@
           <a:p>
             <a:fld id="{E59C0860-C856-4592-9613-44A92B513991}" type="datetimeFigureOut">
               <a:rPr lang="en-US" smtClean="0"/>
-              <a:t>10/18/2019</a:t>
+              <a:t>11/26/2019</a:t>
             </a:fld>
             <a:endParaRPr lang="en-US"/>
           </a:p>
@@ -6429,7 +6431,7 @@
           <a:p>
             <a:fld id="{E59C0860-C856-4592-9613-44A92B513991}" type="datetimeFigureOut">
               <a:rPr lang="en-US" smtClean="0"/>
-              <a:t>10/18/2019</a:t>
+              <a:t>11/26/2019</a:t>
             </a:fld>
             <a:endParaRPr lang="en-US"/>
           </a:p>
@@ -6756,7 +6758,7 @@
           <a:p>
             <a:fld id="{E59C0860-C856-4592-9613-44A92B513991}" type="datetimeFigureOut">
               <a:rPr lang="en-US" smtClean="0"/>
-              <a:t>10/18/2019</a:t>
+              <a:t>11/26/2019</a:t>
             </a:fld>
             <a:endParaRPr lang="en-US"/>
           </a:p>
@@ -7063,7 +7065,7 @@
           <a:p>
             <a:fld id="{E59C0860-C856-4592-9613-44A92B513991}" type="datetimeFigureOut">
               <a:rPr lang="en-US" smtClean="0"/>
-              <a:t>10/18/2019</a:t>
+              <a:t>11/26/2019</a:t>
             </a:fld>
             <a:endParaRPr lang="en-US"/>
           </a:p>
@@ -7861,7 +7863,7 @@
           <a:p>
             <a:fld id="{589E5873-CF7F-45F3-B283-E59B1D6F242C}" type="datetimeFigureOut">
               <a:rPr lang="en-US" smtClean="0"/>
-              <a:t>10/18/2019</a:t>
+              <a:t>11/26/2019</a:t>
             </a:fld>
             <a:endParaRPr lang="en-US"/>
           </a:p>
@@ -9199,34 +9201,6 @@
           <a:chExt cx="0" cy="0"/>
         </a:xfrm>
       </p:grpSpPr>
-      <p:pic>
-        <p:nvPicPr>
-          <p:cNvPr id="4" name="Picture 3">
-            <a:extLst>
-              <a:ext uri="{FF2B5EF4-FFF2-40B4-BE49-F238E27FC236}">
-                <a16:creationId xmlns:a16="http://schemas.microsoft.com/office/drawing/2014/main" id="{E68E48B5-492C-4AB3-BF7B-D574E4043ACD}"/>
-              </a:ext>
-            </a:extLst>
-          </p:cNvPr>
-          <p:cNvPicPr/>
-          <p:nvPr/>
-        </p:nvPicPr>
-        <p:blipFill>
-          <a:blip r:embed="rId2"/>
-          <a:stretch>
-            <a:fillRect/>
-          </a:stretch>
-        </p:blipFill>
-        <p:spPr>
-          <a:xfrm>
-            <a:off x="905163" y="458382"/>
-            <a:ext cx="10381673" cy="5286636"/>
-          </a:xfrm>
-          <a:prstGeom prst="rect">
-            <a:avLst/>
-          </a:prstGeom>
-        </p:spPr>
-      </p:pic>
       <p:sp>
         <p:nvSpPr>
           <p:cNvPr id="5" name="TextBox 4">
@@ -9268,6 +9242,34 @@
           </a:p>
         </p:txBody>
       </p:sp>
+      <p:pic>
+        <p:nvPicPr>
+          <p:cNvPr id="6" name="Picture 5">
+            <a:extLst>
+              <a:ext uri="{FF2B5EF4-FFF2-40B4-BE49-F238E27FC236}">
+                <a16:creationId xmlns:a16="http://schemas.microsoft.com/office/drawing/2014/main" id="{DBF2F6C8-25CF-49D3-97A7-39137DFBFBF7}"/>
+              </a:ext>
+            </a:extLst>
+          </p:cNvPr>
+          <p:cNvPicPr/>
+          <p:nvPr/>
+        </p:nvPicPr>
+        <p:blipFill>
+          <a:blip r:embed="rId2"/>
+          <a:stretch>
+            <a:fillRect/>
+          </a:stretch>
+        </p:blipFill>
+        <p:spPr>
+          <a:xfrm>
+            <a:off x="1051560" y="497840"/>
+            <a:ext cx="10088880" cy="4937760"/>
+          </a:xfrm>
+          <a:prstGeom prst="rect">
+            <a:avLst/>
+          </a:prstGeom>
+        </p:spPr>
+      </p:pic>
     </p:spTree>
     <p:extLst>
       <p:ext uri="{BB962C8B-B14F-4D97-AF65-F5344CB8AC3E}">
@@ -9282,6 +9284,160 @@
 </file>
 
 <file path=ppt/slides/slide12.xml><?xml version="1.0" encoding="utf-8"?>
+<p:sld xmlns:a="http://schemas.openxmlformats.org/drawingml/2006/main" xmlns:r="http://schemas.openxmlformats.org/officeDocument/2006/relationships" xmlns:p="http://schemas.openxmlformats.org/presentationml/2006/main">
+  <p:cSld>
+    <p:spTree>
+      <p:nvGrpSpPr>
+        <p:cNvPr id="1" name=""/>
+        <p:cNvGrpSpPr/>
+        <p:nvPr/>
+      </p:nvGrpSpPr>
+      <p:grpSpPr>
+        <a:xfrm>
+          <a:off x="0" y="0"/>
+          <a:ext cx="0" cy="0"/>
+          <a:chOff x="0" y="0"/>
+          <a:chExt cx="0" cy="0"/>
+        </a:xfrm>
+      </p:grpSpPr>
+      <p:pic>
+        <p:nvPicPr>
+          <p:cNvPr id="4" name="Picture 3">
+            <a:extLst>
+              <a:ext uri="{FF2B5EF4-FFF2-40B4-BE49-F238E27FC236}">
+                <a16:creationId xmlns:a16="http://schemas.microsoft.com/office/drawing/2014/main" id="{C68B97C1-AAA2-4444-902D-77F9CCF3137A}"/>
+              </a:ext>
+            </a:extLst>
+          </p:cNvPr>
+          <p:cNvPicPr/>
+          <p:nvPr/>
+        </p:nvPicPr>
+        <p:blipFill rotWithShape="1">
+          <a:blip r:embed="rId2"/>
+          <a:srcRect b="1456"/>
+          <a:stretch/>
+        </p:blipFill>
+        <p:spPr bwMode="auto">
+          <a:xfrm>
+            <a:off x="568960" y="492124"/>
+            <a:ext cx="10231120" cy="5410836"/>
+          </a:xfrm>
+          <a:prstGeom prst="rect">
+            <a:avLst/>
+          </a:prstGeom>
+          <a:ln>
+            <a:noFill/>
+          </a:ln>
+          <a:extLst>
+            <a:ext uri="{53640926-AAD7-44D8-BBD7-CCE9431645EC}">
+              <a14:shadowObscured xmlns:a14="http://schemas.microsoft.com/office/drawing/2010/main"/>
+            </a:ext>
+          </a:extLst>
+        </p:spPr>
+      </p:pic>
+      <p:pic>
+        <p:nvPicPr>
+          <p:cNvPr id="5" name="Picture 4">
+            <a:extLst>
+              <a:ext uri="{FF2B5EF4-FFF2-40B4-BE49-F238E27FC236}">
+                <a16:creationId xmlns:a16="http://schemas.microsoft.com/office/drawing/2014/main" id="{5F71BF72-269B-43D6-9595-8D68B4D6B86D}"/>
+              </a:ext>
+            </a:extLst>
+          </p:cNvPr>
+          <p:cNvPicPr>
+            <a:picLocks noChangeAspect="1"/>
+          </p:cNvPicPr>
+          <p:nvPr/>
+        </p:nvPicPr>
+        <p:blipFill>
+          <a:blip r:embed="rId3"/>
+          <a:stretch>
+            <a:fillRect/>
+          </a:stretch>
+        </p:blipFill>
+        <p:spPr>
+          <a:xfrm>
+            <a:off x="10752625" y="4123805"/>
+            <a:ext cx="1175657" cy="1281931"/>
+          </a:xfrm>
+          <a:prstGeom prst="rect">
+            <a:avLst/>
+          </a:prstGeom>
+        </p:spPr>
+      </p:pic>
+      <p:pic>
+        <p:nvPicPr>
+          <p:cNvPr id="6" name="Picture 5">
+            <a:extLst>
+              <a:ext uri="{FF2B5EF4-FFF2-40B4-BE49-F238E27FC236}">
+                <a16:creationId xmlns:a16="http://schemas.microsoft.com/office/drawing/2014/main" id="{9835C5B8-79AE-4A00-AC4C-00C8D1BEEB5F}"/>
+              </a:ext>
+            </a:extLst>
+          </p:cNvPr>
+          <p:cNvPicPr>
+            <a:picLocks noChangeAspect="1"/>
+          </p:cNvPicPr>
+          <p:nvPr/>
+        </p:nvPicPr>
+        <p:blipFill rotWithShape="1">
+          <a:blip r:embed="rId4"/>
+          <a:srcRect l="-1" r="2081"/>
+          <a:stretch/>
+        </p:blipFill>
+        <p:spPr>
+          <a:xfrm>
+            <a:off x="10681446" y="2627877"/>
+            <a:ext cx="1381215" cy="1192626"/>
+          </a:xfrm>
+          <a:prstGeom prst="rect">
+            <a:avLst/>
+          </a:prstGeom>
+        </p:spPr>
+      </p:pic>
+      <p:pic>
+        <p:nvPicPr>
+          <p:cNvPr id="7" name="Picture 6">
+            <a:extLst>
+              <a:ext uri="{FF2B5EF4-FFF2-40B4-BE49-F238E27FC236}">
+                <a16:creationId xmlns:a16="http://schemas.microsoft.com/office/drawing/2014/main" id="{FE21CDB3-B1B0-4427-89DD-DE4C1BF797AF}"/>
+              </a:ext>
+            </a:extLst>
+          </p:cNvPr>
+          <p:cNvPicPr>
+            <a:picLocks noChangeAspect="1"/>
+          </p:cNvPicPr>
+          <p:nvPr/>
+        </p:nvPicPr>
+        <p:blipFill>
+          <a:blip r:embed="rId5"/>
+          <a:stretch>
+            <a:fillRect/>
+          </a:stretch>
+        </p:blipFill>
+        <p:spPr>
+          <a:xfrm>
+            <a:off x="10752625" y="795426"/>
+            <a:ext cx="1238856" cy="1529149"/>
+          </a:xfrm>
+          <a:prstGeom prst="rect">
+            <a:avLst/>
+          </a:prstGeom>
+        </p:spPr>
+      </p:pic>
+    </p:spTree>
+    <p:extLst>
+      <p:ext uri="{BB962C8B-B14F-4D97-AF65-F5344CB8AC3E}">
+        <p14:creationId xmlns:p14="http://schemas.microsoft.com/office/powerpoint/2010/main" val="1194241820"/>
+      </p:ext>
+    </p:extLst>
+  </p:cSld>
+  <p:clrMapOvr>
+    <a:masterClrMapping/>
+  </p:clrMapOvr>
+</p:sld>
+</file>
+
+<file path=ppt/slides/slide13.xml><?xml version="1.0" encoding="utf-8"?>
 <p:sld xmlns:a="http://schemas.openxmlformats.org/drawingml/2006/main" xmlns:r="http://schemas.openxmlformats.org/officeDocument/2006/relationships" xmlns:p="http://schemas.openxmlformats.org/presentationml/2006/main">
   <p:cSld>
     <p:spTree>
@@ -9313,7 +9469,7 @@
           <p:nvPr>
             <p:extLst>
               <p:ext uri="{D42A27DB-BD31-4B8C-83A1-F6EECF244321}">
-                <p14:modId xmlns:p14="http://schemas.microsoft.com/office/powerpoint/2010/main" val="2352071853"/>
+                <p14:modId xmlns:p14="http://schemas.microsoft.com/office/powerpoint/2010/main" val="4158102048"/>
               </p:ext>
             </p:extLst>
           </p:nvPr>
@@ -9465,12 +9621,12 @@
                         </a:spcAft>
                       </a:pPr>
                       <a:r>
-                        <a:rPr lang="en-US" sz="2400">
+                        <a:rPr lang="en-US" sz="2400" dirty="0">
                           <a:effectLst/>
                         </a:rPr>
-                        <a:t>0.21</a:t>
+                        <a:t>0.08</a:t>
                       </a:r>
-                      <a:endParaRPr lang="en-US" sz="2400">
+                      <a:endParaRPr lang="en-US" sz="2400" dirty="0">
                         <a:effectLst/>
                         <a:latin typeface="Calibri" panose="020F0502020204030204" pitchFamily="34" charset="0"/>
                         <a:ea typeface="Calibri" panose="020F0502020204030204" pitchFamily="34" charset="0"/>
@@ -9536,12 +9692,12 @@
                         </a:spcAft>
                       </a:pPr>
                       <a:r>
-                        <a:rPr lang="en-US" sz="2400">
+                        <a:rPr lang="en-US" sz="2400" dirty="0">
                           <a:effectLst/>
                         </a:rPr>
-                        <a:t>0.37</a:t>
+                        <a:t>0.16</a:t>
                       </a:r>
-                      <a:endParaRPr lang="en-US" sz="2400">
+                      <a:endParaRPr lang="en-US" sz="2400" dirty="0">
                         <a:effectLst/>
                         <a:latin typeface="Calibri" panose="020F0502020204030204" pitchFamily="34" charset="0"/>
                         <a:ea typeface="Calibri" panose="020F0502020204030204" pitchFamily="34" charset="0"/>
@@ -9607,12 +9763,12 @@
                         </a:spcAft>
                       </a:pPr>
                       <a:r>
-                        <a:rPr lang="en-US" sz="2400">
+                        <a:rPr lang="en-US" sz="2400" dirty="0">
                           <a:effectLst/>
                         </a:rPr>
-                        <a:t>0.24</a:t>
+                        <a:t>0.08</a:t>
                       </a:r>
-                      <a:endParaRPr lang="en-US" sz="2400">
+                      <a:endParaRPr lang="en-US" sz="2400" dirty="0">
                         <a:effectLst/>
                         <a:latin typeface="Calibri" panose="020F0502020204030204" pitchFamily="34" charset="0"/>
                         <a:ea typeface="Calibri" panose="020F0502020204030204" pitchFamily="34" charset="0"/>
@@ -9681,7 +9837,7 @@
                         <a:rPr lang="en-US" sz="2400" dirty="0">
                           <a:effectLst/>
                         </a:rPr>
-                        <a:t>0.05</a:t>
+                        <a:t>0.02</a:t>
                       </a:r>
                       <a:endParaRPr lang="en-US" sz="2400" dirty="0">
                         <a:effectLst/>
@@ -9747,20 +9903,12 @@
           <a:p>
             <a:pPr algn="ctr"/>
             <a:r>
-              <a:rPr lang="en-US" sz="2400">
-                <a:solidFill>
-                  <a:schemeClr val="tx1"/>
-                </a:solidFill>
-              </a:rPr>
-              <a:t>In 21% </a:t>
-            </a:r>
-            <a:r>
               <a:rPr lang="en-US" sz="2400" dirty="0">
                 <a:solidFill>
                   <a:schemeClr val="tx1"/>
                 </a:solidFill>
               </a:rPr>
-              <a:t>of the replications, all Coastal  populations ended in the Extirpated state</a:t>
+              <a:t>In 8% of the replications, all Coastal  populations ended in the Extirpated state</a:t>
             </a:r>
           </a:p>
         </p:txBody>
@@ -9853,7 +10001,7 @@
                   <a:schemeClr val="tx1"/>
                 </a:solidFill>
               </a:rPr>
-              <a:t>In 5% of the replications, all Island Mouse populations ended in the Extirpated state</a:t>
+              <a:t>In 2% of the replications, all Island Mouse populations ended in the Extirpated state</a:t>
             </a:r>
           </a:p>
         </p:txBody>
@@ -9948,7 +10096,7 @@
 </p:sld>
 </file>
 
-<file path=ppt/slides/slide13.xml><?xml version="1.0" encoding="utf-8"?>
+<file path=ppt/slides/slide14.xml><?xml version="1.0" encoding="utf-8"?>
 <p:sld xmlns:a="http://schemas.openxmlformats.org/drawingml/2006/main" xmlns:r="http://schemas.openxmlformats.org/officeDocument/2006/relationships" xmlns:p="http://schemas.openxmlformats.org/presentationml/2006/main">
   <p:cSld>
     <p:spTree>
@@ -9965,40 +10113,12 @@
           <a:chExt cx="0" cy="0"/>
         </a:xfrm>
       </p:grpSpPr>
-      <p:pic>
-        <p:nvPicPr>
-          <p:cNvPr id="4" name="Picture 3">
+      <p:graphicFrame>
+        <p:nvGraphicFramePr>
+          <p:cNvPr id="4" name="Table 3">
             <a:extLst>
               <a:ext uri="{FF2B5EF4-FFF2-40B4-BE49-F238E27FC236}">
-                <a16:creationId xmlns:a16="http://schemas.microsoft.com/office/drawing/2014/main" id="{CA15F64E-A410-46AC-B73A-40DA46234ECA}"/>
-              </a:ext>
-            </a:extLst>
-          </p:cNvPr>
-          <p:cNvPicPr/>
-          <p:nvPr/>
-        </p:nvPicPr>
-        <p:blipFill>
-          <a:blip r:embed="rId3"/>
-          <a:stretch>
-            <a:fillRect/>
-          </a:stretch>
-        </p:blipFill>
-        <p:spPr>
-          <a:xfrm>
-            <a:off x="0" y="1362271"/>
-            <a:ext cx="9287069" cy="4953236"/>
-          </a:xfrm>
-          <a:prstGeom prst="rect">
-            <a:avLst/>
-          </a:prstGeom>
-        </p:spPr>
-      </p:pic>
-      <p:graphicFrame>
-        <p:nvGraphicFramePr>
-          <p:cNvPr id="5" name="Table 4">
-            <a:extLst>
-              <a:ext uri="{FF2B5EF4-FFF2-40B4-BE49-F238E27FC236}">
-                <a16:creationId xmlns:a16="http://schemas.microsoft.com/office/drawing/2014/main" id="{B711001F-6432-41F4-93F3-1C50782833CB}"/>
+                <a16:creationId xmlns:a16="http://schemas.microsoft.com/office/drawing/2014/main" id="{D9859510-3B91-41ED-BF72-BE5E89358A49}"/>
               </a:ext>
             </a:extLst>
           </p:cNvPr>
@@ -10008,14 +10128,14 @@
           <p:nvPr>
             <p:extLst>
               <p:ext uri="{D42A27DB-BD31-4B8C-83A1-F6EECF244321}">
-                <p14:modId xmlns:p14="http://schemas.microsoft.com/office/powerpoint/2010/main" val="2047204259"/>
+                <p14:modId xmlns:p14="http://schemas.microsoft.com/office/powerpoint/2010/main" val="544582270"/>
               </p:ext>
             </p:extLst>
           </p:nvPr>
         </p:nvGraphicFramePr>
         <p:xfrm>
-          <a:off x="8750562" y="109814"/>
-          <a:ext cx="3117976" cy="2504914"/>
+          <a:off x="1967346" y="2596240"/>
+          <a:ext cx="5175163" cy="2640995"/>
         </p:xfrm>
         <a:graphic>
           <a:graphicData uri="http://schemas.openxmlformats.org/drawingml/2006/table">
@@ -10024,14 +10144,14 @@
                 <a:tableStyleId>{5C22544A-7EE6-4342-B048-85BDC9FD1C3A}</a:tableStyleId>
               </a:tblPr>
               <a:tblGrid>
-                <a:gridCol w="1771078">
+                <a:gridCol w="2212061">
                   <a:extLst>
                     <a:ext uri="{9D8B030D-6E8A-4147-A177-3AD203B41FA5}">
                       <a16:colId xmlns:a16="http://schemas.microsoft.com/office/drawing/2014/main" val="3530026925"/>
                     </a:ext>
                   </a:extLst>
                 </a:gridCol>
-                <a:gridCol w="1346898">
+                <a:gridCol w="2963102">
                   <a:extLst>
                     <a:ext uri="{9D8B030D-6E8A-4147-A177-3AD203B41FA5}">
                       <a16:colId xmlns:a16="http://schemas.microsoft.com/office/drawing/2014/main" val="397348910"/>
@@ -10057,12 +10177,12 @@
                         </a:spcAft>
                       </a:pPr>
                       <a:r>
-                        <a:rPr lang="en-US" sz="2000" dirty="0">
+                        <a:rPr lang="en-US" sz="2400" dirty="0">
                           <a:effectLst/>
                         </a:rPr>
                         <a:t>Ecotype</a:t>
                       </a:r>
-                      <a:endParaRPr lang="en-US" sz="2000" dirty="0">
+                      <a:endParaRPr lang="en-US" sz="2400" dirty="0">
                         <a:effectLst/>
                         <a:latin typeface="Calibri" panose="020F0502020204030204" pitchFamily="34" charset="0"/>
                         <a:ea typeface="Calibri" panose="020F0502020204030204" pitchFamily="34" charset="0"/>
@@ -10089,31 +10209,12 @@
                         </a:spcAft>
                       </a:pPr>
                       <a:r>
-                        <a:rPr lang="en-US" sz="2000" dirty="0">
+                        <a:rPr lang="en-US" sz="2400" dirty="0">
                           <a:effectLst/>
                         </a:rPr>
-                        <a:t>Extinction </a:t>
+                        <a:t>Prob. of at least one high abundance</a:t>
                       </a:r>
-                    </a:p>
-                    <a:p>
-                      <a:pPr marL="0" marR="0" algn="ctr">
-                        <a:lnSpc>
-                          <a:spcPct val="115000"/>
-                        </a:lnSpc>
-                        <a:spcBef>
-                          <a:spcPts val="0"/>
-                        </a:spcBef>
-                        <a:spcAft>
-                          <a:spcPts val="0"/>
-                        </a:spcAft>
-                      </a:pPr>
-                      <a:r>
-                        <a:rPr lang="en-US" sz="2000" dirty="0">
-                          <a:effectLst/>
-                        </a:rPr>
-                        <a:t>probability</a:t>
-                      </a:r>
-                      <a:endParaRPr lang="en-US" sz="2000" dirty="0">
+                      <a:endParaRPr lang="en-US" sz="2400" dirty="0">
                         <a:effectLst/>
                         <a:latin typeface="Calibri" panose="020F0502020204030204" pitchFamily="34" charset="0"/>
                         <a:ea typeface="Calibri" panose="020F0502020204030204" pitchFamily="34" charset="0"/>
@@ -10147,12 +10248,12 @@
                         </a:spcAft>
                       </a:pPr>
                       <a:r>
-                        <a:rPr lang="en-US" sz="2000">
+                        <a:rPr lang="en-US" sz="2400">
                           <a:effectLst/>
                         </a:rPr>
                         <a:t>Coastal</a:t>
                       </a:r>
-                      <a:endParaRPr lang="en-US" sz="2000">
+                      <a:endParaRPr lang="en-US" sz="2400">
                         <a:effectLst/>
                         <a:latin typeface="Calibri" panose="020F0502020204030204" pitchFamily="34" charset="0"/>
                         <a:ea typeface="Calibri" panose="020F0502020204030204" pitchFamily="34" charset="0"/>
@@ -10179,17 +10280,14 @@
                         </a:spcAft>
                       </a:pPr>
                       <a:r>
-                        <a:rPr lang="en-US" sz="2000" dirty="0">
+                        <a:rPr lang="en-US" sz="2400" dirty="0">
                           <a:effectLst/>
+                          <a:latin typeface="Calibri" panose="020F0502020204030204" pitchFamily="34" charset="0"/>
+                          <a:ea typeface="Calibri" panose="020F0502020204030204" pitchFamily="34" charset="0"/>
+                          <a:cs typeface="Times New Roman" panose="02020603050405020304" pitchFamily="18" charset="0"/>
                         </a:rPr>
-                        <a:t>0.21</a:t>
+                        <a:t>0.61</a:t>
                       </a:r>
-                      <a:endParaRPr lang="en-US" sz="2000" dirty="0">
-                        <a:effectLst/>
-                        <a:latin typeface="Calibri" panose="020F0502020204030204" pitchFamily="34" charset="0"/>
-                        <a:ea typeface="Calibri" panose="020F0502020204030204" pitchFamily="34" charset="0"/>
-                        <a:cs typeface="Times New Roman" panose="02020603050405020304" pitchFamily="18" charset="0"/>
-                      </a:endParaRPr>
                     </a:p>
                   </a:txBody>
                   <a:tcPr marL="68580" marR="68580" marT="0" marB="0" anchor="ctr"/>
@@ -10218,12 +10316,12 @@
                         </a:spcAft>
                       </a:pPr>
                       <a:r>
-                        <a:rPr lang="en-US" sz="2000">
+                        <a:rPr lang="en-US" sz="2400">
                           <a:effectLst/>
                         </a:rPr>
                         <a:t>Mountain</a:t>
                       </a:r>
-                      <a:endParaRPr lang="en-US" sz="2000">
+                      <a:endParaRPr lang="en-US" sz="2400">
                         <a:effectLst/>
                         <a:latin typeface="Calibri" panose="020F0502020204030204" pitchFamily="34" charset="0"/>
                         <a:ea typeface="Calibri" panose="020F0502020204030204" pitchFamily="34" charset="0"/>
@@ -10250,12 +10348,12 @@
                         </a:spcAft>
                       </a:pPr>
                       <a:r>
-                        <a:rPr lang="en-US" sz="2000" dirty="0">
+                        <a:rPr lang="en-US" sz="2400" dirty="0">
                           <a:effectLst/>
                         </a:rPr>
-                        <a:t>0.37</a:t>
+                        <a:t>0.52</a:t>
                       </a:r>
-                      <a:endParaRPr lang="en-US" sz="2000" dirty="0">
+                      <a:endParaRPr lang="en-US" sz="2400" dirty="0">
                         <a:effectLst/>
                         <a:latin typeface="Calibri" panose="020F0502020204030204" pitchFamily="34" charset="0"/>
                         <a:ea typeface="Calibri" panose="020F0502020204030204" pitchFamily="34" charset="0"/>
@@ -10289,12 +10387,12 @@
                         </a:spcAft>
                       </a:pPr>
                       <a:r>
-                        <a:rPr lang="en-US" sz="2000">
+                        <a:rPr lang="en-US" sz="2400">
                           <a:effectLst/>
                         </a:rPr>
                         <a:t>Paradise Palms</a:t>
                       </a:r>
-                      <a:endParaRPr lang="en-US" sz="2000">
+                      <a:endParaRPr lang="en-US" sz="2400">
                         <a:effectLst/>
                         <a:latin typeface="Calibri" panose="020F0502020204030204" pitchFamily="34" charset="0"/>
                         <a:ea typeface="Calibri" panose="020F0502020204030204" pitchFamily="34" charset="0"/>
@@ -10321,12 +10419,12 @@
                         </a:spcAft>
                       </a:pPr>
                       <a:r>
-                        <a:rPr lang="en-US" sz="2000" dirty="0">
+                        <a:rPr lang="en-US" sz="2400" dirty="0">
                           <a:effectLst/>
                         </a:rPr>
-                        <a:t>0.24</a:t>
+                        <a:t>0.63</a:t>
                       </a:r>
-                      <a:endParaRPr lang="en-US" sz="2000" dirty="0">
+                      <a:endParaRPr lang="en-US" sz="2400" dirty="0">
                         <a:effectLst/>
                         <a:latin typeface="Calibri" panose="020F0502020204030204" pitchFamily="34" charset="0"/>
                         <a:ea typeface="Calibri" panose="020F0502020204030204" pitchFamily="34" charset="0"/>
@@ -10360,12 +10458,12 @@
                         </a:spcAft>
                       </a:pPr>
                       <a:r>
-                        <a:rPr lang="en-US" sz="2000">
+                        <a:rPr lang="en-US" sz="2400">
                           <a:effectLst/>
                         </a:rPr>
                         <a:t>Overall</a:t>
                       </a:r>
-                      <a:endParaRPr lang="en-US" sz="2000">
+                      <a:endParaRPr lang="en-US" sz="2400">
                         <a:effectLst/>
                         <a:latin typeface="Calibri" panose="020F0502020204030204" pitchFamily="34" charset="0"/>
                         <a:ea typeface="Calibri" panose="020F0502020204030204" pitchFamily="34" charset="0"/>
@@ -10392,12 +10490,12 @@
                         </a:spcAft>
                       </a:pPr>
                       <a:r>
-                        <a:rPr lang="en-US" sz="2000" dirty="0">
+                        <a:rPr lang="en-US" sz="2400" dirty="0">
                           <a:effectLst/>
                         </a:rPr>
-                        <a:t>0.05</a:t>
+                        <a:t>0.83</a:t>
                       </a:r>
-                      <a:endParaRPr lang="en-US" sz="2000" dirty="0">
+                      <a:endParaRPr lang="en-US" sz="2400" dirty="0">
                         <a:effectLst/>
                         <a:latin typeface="Calibri" panose="020F0502020204030204" pitchFamily="34" charset="0"/>
                         <a:ea typeface="Calibri" panose="020F0502020204030204" pitchFamily="34" charset="0"/>
@@ -10417,6 +10515,288 @@
           </a:graphicData>
         </a:graphic>
       </p:graphicFrame>
+      <p:sp>
+        <p:nvSpPr>
+          <p:cNvPr id="5" name="Rectangle 4">
+            <a:extLst>
+              <a:ext uri="{FF2B5EF4-FFF2-40B4-BE49-F238E27FC236}">
+                <a16:creationId xmlns:a16="http://schemas.microsoft.com/office/drawing/2014/main" id="{9042D135-3F6A-4C72-82C7-CF4BF5F74796}"/>
+              </a:ext>
+            </a:extLst>
+          </p:cNvPr>
+          <p:cNvSpPr/>
+          <p:nvPr/>
+        </p:nvSpPr>
+        <p:spPr>
+          <a:xfrm>
+            <a:off x="7222836" y="683492"/>
+            <a:ext cx="4230256" cy="1468582"/>
+          </a:xfrm>
+          <a:prstGeom prst="rect">
+            <a:avLst/>
+          </a:prstGeom>
+          <a:noFill/>
+        </p:spPr>
+        <p:style>
+          <a:lnRef idx="2">
+            <a:schemeClr val="accent1">
+              <a:shade val="50000"/>
+            </a:schemeClr>
+          </a:lnRef>
+          <a:fillRef idx="1">
+            <a:schemeClr val="accent1"/>
+          </a:fillRef>
+          <a:effectRef idx="0">
+            <a:schemeClr val="accent1"/>
+          </a:effectRef>
+          <a:fontRef idx="minor">
+            <a:schemeClr val="lt1"/>
+          </a:fontRef>
+        </p:style>
+        <p:txBody>
+          <a:bodyPr rtlCol="0" anchor="ctr"/>
+          <a:lstStyle/>
+          <a:p>
+            <a:pPr algn="ctr"/>
+            <a:r>
+              <a:rPr lang="en-US" sz="2400" dirty="0">
+                <a:solidFill>
+                  <a:schemeClr val="tx1"/>
+                </a:solidFill>
+              </a:rPr>
+              <a:t>In 61% of the replications, at least one Coastal population ended in the high abundance state</a:t>
+            </a:r>
+          </a:p>
+        </p:txBody>
+      </p:sp>
+      <p:cxnSp>
+        <p:nvCxnSpPr>
+          <p:cNvPr id="7" name="Straight Arrow Connector 6">
+            <a:extLst>
+              <a:ext uri="{FF2B5EF4-FFF2-40B4-BE49-F238E27FC236}">
+                <a16:creationId xmlns:a16="http://schemas.microsoft.com/office/drawing/2014/main" id="{41DF2264-9338-435C-B9FA-BA75DCEF9F3B}"/>
+              </a:ext>
+            </a:extLst>
+          </p:cNvPr>
+          <p:cNvCxnSpPr/>
+          <p:nvPr/>
+        </p:nvCxnSpPr>
+        <p:spPr>
+          <a:xfrm flipV="1">
+            <a:off x="7222836" y="2225964"/>
+            <a:ext cx="1348509" cy="1062181"/>
+          </a:xfrm>
+          <a:prstGeom prst="straightConnector1">
+            <a:avLst/>
+          </a:prstGeom>
+          <a:ln w="76200">
+            <a:tailEnd type="triangle"/>
+          </a:ln>
+        </p:spPr>
+        <p:style>
+          <a:lnRef idx="1">
+            <a:schemeClr val="accent1"/>
+          </a:lnRef>
+          <a:fillRef idx="0">
+            <a:schemeClr val="accent1"/>
+          </a:fillRef>
+          <a:effectRef idx="0">
+            <a:schemeClr val="accent1"/>
+          </a:effectRef>
+          <a:fontRef idx="minor">
+            <a:schemeClr val="tx1"/>
+          </a:fontRef>
+        </p:style>
+      </p:cxnSp>
+      <p:sp>
+        <p:nvSpPr>
+          <p:cNvPr id="8" name="Rectangle 7">
+            <a:extLst>
+              <a:ext uri="{FF2B5EF4-FFF2-40B4-BE49-F238E27FC236}">
+                <a16:creationId xmlns:a16="http://schemas.microsoft.com/office/drawing/2014/main" id="{1197AEA4-EBC8-4021-8053-7BD7D408F45C}"/>
+              </a:ext>
+            </a:extLst>
+          </p:cNvPr>
+          <p:cNvSpPr/>
+          <p:nvPr/>
+        </p:nvSpPr>
+        <p:spPr>
+          <a:xfrm>
+            <a:off x="7680036" y="3971636"/>
+            <a:ext cx="4230256" cy="1468582"/>
+          </a:xfrm>
+          <a:prstGeom prst="rect">
+            <a:avLst/>
+          </a:prstGeom>
+          <a:noFill/>
+        </p:spPr>
+        <p:style>
+          <a:lnRef idx="2">
+            <a:schemeClr val="accent1">
+              <a:shade val="50000"/>
+            </a:schemeClr>
+          </a:lnRef>
+          <a:fillRef idx="1">
+            <a:schemeClr val="accent1"/>
+          </a:fillRef>
+          <a:effectRef idx="0">
+            <a:schemeClr val="accent1"/>
+          </a:effectRef>
+          <a:fontRef idx="minor">
+            <a:schemeClr val="lt1"/>
+          </a:fontRef>
+        </p:style>
+        <p:txBody>
+          <a:bodyPr rtlCol="0" anchor="ctr"/>
+          <a:lstStyle/>
+          <a:p>
+            <a:pPr algn="ctr"/>
+            <a:r>
+              <a:rPr lang="en-US" sz="2400" dirty="0">
+                <a:solidFill>
+                  <a:schemeClr val="tx1"/>
+                </a:solidFill>
+              </a:rPr>
+              <a:t>In 83% of the replications, at least one population from any ecotype ended in the high abundance state</a:t>
+            </a:r>
+          </a:p>
+        </p:txBody>
+      </p:sp>
+      <p:cxnSp>
+        <p:nvCxnSpPr>
+          <p:cNvPr id="9" name="Straight Arrow Connector 8">
+            <a:extLst>
+              <a:ext uri="{FF2B5EF4-FFF2-40B4-BE49-F238E27FC236}">
+                <a16:creationId xmlns:a16="http://schemas.microsoft.com/office/drawing/2014/main" id="{F5DA7198-9D99-48E2-A4DE-BB15FA43C998}"/>
+              </a:ext>
+            </a:extLst>
+          </p:cNvPr>
+          <p:cNvCxnSpPr>
+            <a:cxnSpLocks/>
+            <a:endCxn id="8" idx="1"/>
+          </p:cNvCxnSpPr>
+          <p:nvPr/>
+        </p:nvCxnSpPr>
+        <p:spPr>
+          <a:xfrm flipV="1">
+            <a:off x="7142509" y="4705927"/>
+            <a:ext cx="537527" cy="323273"/>
+          </a:xfrm>
+          <a:prstGeom prst="straightConnector1">
+            <a:avLst/>
+          </a:prstGeom>
+          <a:ln w="76200">
+            <a:tailEnd type="triangle"/>
+          </a:ln>
+        </p:spPr>
+        <p:style>
+          <a:lnRef idx="1">
+            <a:schemeClr val="accent1"/>
+          </a:lnRef>
+          <a:fillRef idx="0">
+            <a:schemeClr val="accent1"/>
+          </a:fillRef>
+          <a:effectRef idx="0">
+            <a:schemeClr val="accent1"/>
+          </a:effectRef>
+          <a:fontRef idx="minor">
+            <a:schemeClr val="tx1"/>
+          </a:fontRef>
+        </p:style>
+      </p:cxnSp>
+      <p:sp>
+        <p:nvSpPr>
+          <p:cNvPr id="11" name="TextBox 10">
+            <a:extLst>
+              <a:ext uri="{FF2B5EF4-FFF2-40B4-BE49-F238E27FC236}">
+                <a16:creationId xmlns:a16="http://schemas.microsoft.com/office/drawing/2014/main" id="{EC81302E-AE57-4D16-8350-71D3433FA8A5}"/>
+              </a:ext>
+            </a:extLst>
+          </p:cNvPr>
+          <p:cNvSpPr txBox="1"/>
+          <p:nvPr/>
+        </p:nvSpPr>
+        <p:spPr>
+          <a:xfrm>
+            <a:off x="526473" y="314036"/>
+            <a:ext cx="5098472" cy="584775"/>
+          </a:xfrm>
+          <a:prstGeom prst="rect">
+            <a:avLst/>
+          </a:prstGeom>
+          <a:noFill/>
+        </p:spPr>
+        <p:txBody>
+          <a:bodyPr wrap="square" rtlCol="0">
+            <a:spAutoFit/>
+          </a:bodyPr>
+          <a:lstStyle/>
+          <a:p>
+            <a:r>
+              <a:rPr lang="en-US" sz="3200" dirty="0"/>
+              <a:t>Baseline conditions</a:t>
+            </a:r>
+          </a:p>
+        </p:txBody>
+      </p:sp>
+    </p:spTree>
+    <p:extLst>
+      <p:ext uri="{BB962C8B-B14F-4D97-AF65-F5344CB8AC3E}">
+        <p14:creationId xmlns:p14="http://schemas.microsoft.com/office/powerpoint/2010/main" val="4096140964"/>
+      </p:ext>
+    </p:extLst>
+  </p:cSld>
+  <p:clrMapOvr>
+    <a:masterClrMapping/>
+  </p:clrMapOvr>
+</p:sld>
+</file>
+
+<file path=ppt/slides/slide15.xml><?xml version="1.0" encoding="utf-8"?>
+<p:sld xmlns:a="http://schemas.openxmlformats.org/drawingml/2006/main" xmlns:r="http://schemas.openxmlformats.org/officeDocument/2006/relationships" xmlns:p="http://schemas.openxmlformats.org/presentationml/2006/main">
+  <p:cSld>
+    <p:spTree>
+      <p:nvGrpSpPr>
+        <p:cNvPr id="1" name=""/>
+        <p:cNvGrpSpPr/>
+        <p:nvPr/>
+      </p:nvGrpSpPr>
+      <p:grpSpPr>
+        <a:xfrm>
+          <a:off x="0" y="0"/>
+          <a:ext cx="0" cy="0"/>
+          <a:chOff x="0" y="0"/>
+          <a:chExt cx="0" cy="0"/>
+        </a:xfrm>
+      </p:grpSpPr>
+      <p:pic>
+        <p:nvPicPr>
+          <p:cNvPr id="6" name="Picture 5">
+            <a:extLst>
+              <a:ext uri="{FF2B5EF4-FFF2-40B4-BE49-F238E27FC236}">
+                <a16:creationId xmlns:a16="http://schemas.microsoft.com/office/drawing/2014/main" id="{3DA8D091-75BE-4C4B-A640-EFD8E01F3C8F}"/>
+              </a:ext>
+            </a:extLst>
+          </p:cNvPr>
+          <p:cNvPicPr/>
+          <p:nvPr/>
+        </p:nvPicPr>
+        <p:blipFill>
+          <a:blip r:embed="rId3"/>
+          <a:stretch>
+            <a:fillRect/>
+          </a:stretch>
+        </p:blipFill>
+        <p:spPr>
+          <a:xfrm>
+            <a:off x="122330" y="1625600"/>
+            <a:ext cx="9358394" cy="4532190"/>
+          </a:xfrm>
+          <a:prstGeom prst="rect">
+            <a:avLst/>
+          </a:prstGeom>
+        </p:spPr>
+      </p:pic>
       <p:sp>
         <p:nvSpPr>
           <p:cNvPr id="7" name="Content Placeholder 2">
@@ -10617,6 +10997,411 @@
           </a:p>
         </p:txBody>
       </p:sp>
+      <p:graphicFrame>
+        <p:nvGraphicFramePr>
+          <p:cNvPr id="8" name="Table 7">
+            <a:extLst>
+              <a:ext uri="{FF2B5EF4-FFF2-40B4-BE49-F238E27FC236}">
+                <a16:creationId xmlns:a16="http://schemas.microsoft.com/office/drawing/2014/main" id="{D4294A30-F5A1-4CB5-B897-344A369BF732}"/>
+              </a:ext>
+            </a:extLst>
+          </p:cNvPr>
+          <p:cNvGraphicFramePr>
+            <a:graphicFrameLocks noGrp="1"/>
+          </p:cNvGraphicFramePr>
+          <p:nvPr>
+            <p:extLst>
+              <p:ext uri="{D42A27DB-BD31-4B8C-83A1-F6EECF244321}">
+                <p14:modId xmlns:p14="http://schemas.microsoft.com/office/powerpoint/2010/main" val="1390597294"/>
+              </p:ext>
+            </p:extLst>
+          </p:nvPr>
+        </p:nvGraphicFramePr>
+        <p:xfrm>
+          <a:off x="8675827" y="60959"/>
+          <a:ext cx="3434893" cy="2729268"/>
+        </p:xfrm>
+        <a:graphic>
+          <a:graphicData uri="http://schemas.openxmlformats.org/drawingml/2006/table">
+            <a:tbl>
+              <a:tblPr firstRow="1" firstCol="1" bandRow="1">
+                <a:tableStyleId>{5C22544A-7EE6-4342-B048-85BDC9FD1C3A}</a:tableStyleId>
+              </a:tblPr>
+              <a:tblGrid>
+                <a:gridCol w="1468204">
+                  <a:extLst>
+                    <a:ext uri="{9D8B030D-6E8A-4147-A177-3AD203B41FA5}">
+                      <a16:colId xmlns:a16="http://schemas.microsoft.com/office/drawing/2014/main" val="3530026925"/>
+                    </a:ext>
+                  </a:extLst>
+                </a:gridCol>
+                <a:gridCol w="1966689">
+                  <a:extLst>
+                    <a:ext uri="{9D8B030D-6E8A-4147-A177-3AD203B41FA5}">
+                      <a16:colId xmlns:a16="http://schemas.microsoft.com/office/drawing/2014/main" val="397348910"/>
+                    </a:ext>
+                  </a:extLst>
+                </a:gridCol>
+              </a:tblGrid>
+              <a:tr h="456112">
+                <a:tc>
+                  <a:txBody>
+                    <a:bodyPr/>
+                    <a:lstStyle/>
+                    <a:p>
+                      <a:pPr marL="0" marR="0" algn="ctr">
+                        <a:lnSpc>
+                          <a:spcPct val="115000"/>
+                        </a:lnSpc>
+                        <a:spcBef>
+                          <a:spcPts val="0"/>
+                        </a:spcBef>
+                        <a:spcAft>
+                          <a:spcPts val="0"/>
+                        </a:spcAft>
+                      </a:pPr>
+                      <a:r>
+                        <a:rPr lang="en-US" sz="2000" dirty="0">
+                          <a:effectLst/>
+                        </a:rPr>
+                        <a:t>Ecotype</a:t>
+                      </a:r>
+                      <a:endParaRPr lang="en-US" sz="2000" dirty="0">
+                        <a:effectLst/>
+                        <a:latin typeface="Calibri" panose="020F0502020204030204" pitchFamily="34" charset="0"/>
+                        <a:ea typeface="Calibri" panose="020F0502020204030204" pitchFamily="34" charset="0"/>
+                        <a:cs typeface="Times New Roman" panose="02020603050405020304" pitchFamily="18" charset="0"/>
+                      </a:endParaRPr>
+                    </a:p>
+                  </a:txBody>
+                  <a:tcPr marL="68580" marR="68580" marT="0" marB="0" anchor="ctr"/>
+                </a:tc>
+                <a:tc>
+                  <a:txBody>
+                    <a:bodyPr/>
+                    <a:lstStyle/>
+                    <a:p>
+                      <a:pPr marL="0" marR="0" algn="ctr">
+                        <a:lnSpc>
+                          <a:spcPct val="115000"/>
+                        </a:lnSpc>
+                        <a:spcBef>
+                          <a:spcPts val="0"/>
+                        </a:spcBef>
+                        <a:spcAft>
+                          <a:spcPts val="0"/>
+                        </a:spcAft>
+                      </a:pPr>
+                      <a:r>
+                        <a:rPr lang="en-US" sz="2000" dirty="0">
+                          <a:effectLst/>
+                        </a:rPr>
+                        <a:t>Extinction probability</a:t>
+                      </a:r>
+                      <a:endParaRPr lang="en-US" sz="2000" dirty="0">
+                        <a:effectLst/>
+                        <a:latin typeface="Calibri" panose="020F0502020204030204" pitchFamily="34" charset="0"/>
+                        <a:ea typeface="Calibri" panose="020F0502020204030204" pitchFamily="34" charset="0"/>
+                        <a:cs typeface="Times New Roman" panose="02020603050405020304" pitchFamily="18" charset="0"/>
+                      </a:endParaRPr>
+                    </a:p>
+                  </a:txBody>
+                  <a:tcPr marL="68580" marR="68580" marT="0" marB="0" anchor="ctr"/>
+                </a:tc>
+                <a:extLst>
+                  <a:ext uri="{0D108BD9-81ED-4DB2-BD59-A6C34878D82A}">
+                    <a16:rowId xmlns:a16="http://schemas.microsoft.com/office/drawing/2014/main" val="3744627863"/>
+                  </a:ext>
+                </a:extLst>
+              </a:tr>
+              <a:tr h="456112">
+                <a:tc>
+                  <a:txBody>
+                    <a:bodyPr/>
+                    <a:lstStyle/>
+                    <a:p>
+                      <a:pPr marL="0" marR="0" algn="ctr">
+                        <a:lnSpc>
+                          <a:spcPct val="115000"/>
+                        </a:lnSpc>
+                        <a:spcBef>
+                          <a:spcPts val="0"/>
+                        </a:spcBef>
+                        <a:spcAft>
+                          <a:spcPts val="0"/>
+                        </a:spcAft>
+                      </a:pPr>
+                      <a:r>
+                        <a:rPr lang="en-US" sz="2000">
+                          <a:effectLst/>
+                        </a:rPr>
+                        <a:t>Coastal</a:t>
+                      </a:r>
+                      <a:endParaRPr lang="en-US" sz="2000">
+                        <a:effectLst/>
+                        <a:latin typeface="Calibri" panose="020F0502020204030204" pitchFamily="34" charset="0"/>
+                        <a:ea typeface="Calibri" panose="020F0502020204030204" pitchFamily="34" charset="0"/>
+                        <a:cs typeface="Times New Roman" panose="02020603050405020304" pitchFamily="18" charset="0"/>
+                      </a:endParaRPr>
+                    </a:p>
+                  </a:txBody>
+                  <a:tcPr marL="68580" marR="68580" marT="0" marB="0" anchor="ctr"/>
+                </a:tc>
+                <a:tc>
+                  <a:txBody>
+                    <a:bodyPr/>
+                    <a:lstStyle/>
+                    <a:p>
+                      <a:pPr marL="0" marR="0" algn="ctr">
+                        <a:lnSpc>
+                          <a:spcPct val="115000"/>
+                        </a:lnSpc>
+                        <a:spcBef>
+                          <a:spcPts val="0"/>
+                        </a:spcBef>
+                        <a:spcAft>
+                          <a:spcPts val="0"/>
+                        </a:spcAft>
+                      </a:pPr>
+                      <a:r>
+                        <a:rPr lang="en-US" sz="2000" dirty="0">
+                          <a:effectLst/>
+                        </a:rPr>
+                        <a:t>0.08</a:t>
+                      </a:r>
+                      <a:endParaRPr lang="en-US" sz="2000" dirty="0">
+                        <a:effectLst/>
+                        <a:latin typeface="Calibri" panose="020F0502020204030204" pitchFamily="34" charset="0"/>
+                        <a:ea typeface="Calibri" panose="020F0502020204030204" pitchFamily="34" charset="0"/>
+                        <a:cs typeface="Times New Roman" panose="02020603050405020304" pitchFamily="18" charset="0"/>
+                      </a:endParaRPr>
+                    </a:p>
+                  </a:txBody>
+                  <a:tcPr marL="68580" marR="68580" marT="0" marB="0" anchor="ctr"/>
+                </a:tc>
+                <a:extLst>
+                  <a:ext uri="{0D108BD9-81ED-4DB2-BD59-A6C34878D82A}">
+                    <a16:rowId xmlns:a16="http://schemas.microsoft.com/office/drawing/2014/main" val="3251184248"/>
+                  </a:ext>
+                </a:extLst>
+              </a:tr>
+              <a:tr h="456112">
+                <a:tc>
+                  <a:txBody>
+                    <a:bodyPr/>
+                    <a:lstStyle/>
+                    <a:p>
+                      <a:pPr marL="0" marR="0" algn="ctr">
+                        <a:lnSpc>
+                          <a:spcPct val="115000"/>
+                        </a:lnSpc>
+                        <a:spcBef>
+                          <a:spcPts val="0"/>
+                        </a:spcBef>
+                        <a:spcAft>
+                          <a:spcPts val="0"/>
+                        </a:spcAft>
+                      </a:pPr>
+                      <a:r>
+                        <a:rPr lang="en-US" sz="2000">
+                          <a:effectLst/>
+                        </a:rPr>
+                        <a:t>Mountain</a:t>
+                      </a:r>
+                      <a:endParaRPr lang="en-US" sz="2000">
+                        <a:effectLst/>
+                        <a:latin typeface="Calibri" panose="020F0502020204030204" pitchFamily="34" charset="0"/>
+                        <a:ea typeface="Calibri" panose="020F0502020204030204" pitchFamily="34" charset="0"/>
+                        <a:cs typeface="Times New Roman" panose="02020603050405020304" pitchFamily="18" charset="0"/>
+                      </a:endParaRPr>
+                    </a:p>
+                  </a:txBody>
+                  <a:tcPr marL="68580" marR="68580" marT="0" marB="0" anchor="ctr"/>
+                </a:tc>
+                <a:tc>
+                  <a:txBody>
+                    <a:bodyPr/>
+                    <a:lstStyle/>
+                    <a:p>
+                      <a:pPr marL="0" marR="0" algn="ctr">
+                        <a:lnSpc>
+                          <a:spcPct val="115000"/>
+                        </a:lnSpc>
+                        <a:spcBef>
+                          <a:spcPts val="0"/>
+                        </a:spcBef>
+                        <a:spcAft>
+                          <a:spcPts val="0"/>
+                        </a:spcAft>
+                      </a:pPr>
+                      <a:r>
+                        <a:rPr lang="en-US" sz="2000" dirty="0">
+                          <a:effectLst/>
+                        </a:rPr>
+                        <a:t>0.16</a:t>
+                      </a:r>
+                      <a:endParaRPr lang="en-US" sz="2000" dirty="0">
+                        <a:effectLst/>
+                        <a:latin typeface="Calibri" panose="020F0502020204030204" pitchFamily="34" charset="0"/>
+                        <a:ea typeface="Calibri" panose="020F0502020204030204" pitchFamily="34" charset="0"/>
+                        <a:cs typeface="Times New Roman" panose="02020603050405020304" pitchFamily="18" charset="0"/>
+                      </a:endParaRPr>
+                    </a:p>
+                  </a:txBody>
+                  <a:tcPr marL="68580" marR="68580" marT="0" marB="0" anchor="ctr"/>
+                </a:tc>
+                <a:extLst>
+                  <a:ext uri="{0D108BD9-81ED-4DB2-BD59-A6C34878D82A}">
+                    <a16:rowId xmlns:a16="http://schemas.microsoft.com/office/drawing/2014/main" val="3620559345"/>
+                  </a:ext>
+                </a:extLst>
+              </a:tr>
+              <a:tr h="456112">
+                <a:tc>
+                  <a:txBody>
+                    <a:bodyPr/>
+                    <a:lstStyle/>
+                    <a:p>
+                      <a:pPr marL="0" marR="0" algn="ctr">
+                        <a:lnSpc>
+                          <a:spcPct val="115000"/>
+                        </a:lnSpc>
+                        <a:spcBef>
+                          <a:spcPts val="0"/>
+                        </a:spcBef>
+                        <a:spcAft>
+                          <a:spcPts val="0"/>
+                        </a:spcAft>
+                      </a:pPr>
+                      <a:r>
+                        <a:rPr lang="en-US" sz="2000">
+                          <a:effectLst/>
+                        </a:rPr>
+                        <a:t>Paradise Palms</a:t>
+                      </a:r>
+                      <a:endParaRPr lang="en-US" sz="2000">
+                        <a:effectLst/>
+                        <a:latin typeface="Calibri" panose="020F0502020204030204" pitchFamily="34" charset="0"/>
+                        <a:ea typeface="Calibri" panose="020F0502020204030204" pitchFamily="34" charset="0"/>
+                        <a:cs typeface="Times New Roman" panose="02020603050405020304" pitchFamily="18" charset="0"/>
+                      </a:endParaRPr>
+                    </a:p>
+                  </a:txBody>
+                  <a:tcPr marL="68580" marR="68580" marT="0" marB="0" anchor="ctr"/>
+                </a:tc>
+                <a:tc>
+                  <a:txBody>
+                    <a:bodyPr/>
+                    <a:lstStyle/>
+                    <a:p>
+                      <a:pPr marL="0" marR="0" algn="ctr">
+                        <a:lnSpc>
+                          <a:spcPct val="115000"/>
+                        </a:lnSpc>
+                        <a:spcBef>
+                          <a:spcPts val="0"/>
+                        </a:spcBef>
+                        <a:spcAft>
+                          <a:spcPts val="0"/>
+                        </a:spcAft>
+                      </a:pPr>
+                      <a:r>
+                        <a:rPr lang="en-US" sz="2000" dirty="0">
+                          <a:effectLst/>
+                        </a:rPr>
+                        <a:t>0.08</a:t>
+                      </a:r>
+                      <a:endParaRPr lang="en-US" sz="2000" dirty="0">
+                        <a:effectLst/>
+                        <a:latin typeface="Calibri" panose="020F0502020204030204" pitchFamily="34" charset="0"/>
+                        <a:ea typeface="Calibri" panose="020F0502020204030204" pitchFamily="34" charset="0"/>
+                        <a:cs typeface="Times New Roman" panose="02020603050405020304" pitchFamily="18" charset="0"/>
+                      </a:endParaRPr>
+                    </a:p>
+                  </a:txBody>
+                  <a:tcPr marL="68580" marR="68580" marT="0" marB="0" anchor="ctr"/>
+                </a:tc>
+                <a:extLst>
+                  <a:ext uri="{0D108BD9-81ED-4DB2-BD59-A6C34878D82A}">
+                    <a16:rowId xmlns:a16="http://schemas.microsoft.com/office/drawing/2014/main" val="3366720186"/>
+                  </a:ext>
+                </a:extLst>
+              </a:tr>
+              <a:tr h="456112">
+                <a:tc>
+                  <a:txBody>
+                    <a:bodyPr/>
+                    <a:lstStyle/>
+                    <a:p>
+                      <a:pPr marL="0" marR="0" algn="ctr">
+                        <a:lnSpc>
+                          <a:spcPct val="115000"/>
+                        </a:lnSpc>
+                        <a:spcBef>
+                          <a:spcPts val="0"/>
+                        </a:spcBef>
+                        <a:spcAft>
+                          <a:spcPts val="0"/>
+                        </a:spcAft>
+                      </a:pPr>
+                      <a:r>
+                        <a:rPr lang="en-US" sz="2000">
+                          <a:effectLst/>
+                        </a:rPr>
+                        <a:t>Overall</a:t>
+                      </a:r>
+                      <a:endParaRPr lang="en-US" sz="2000">
+                        <a:effectLst/>
+                        <a:latin typeface="Calibri" panose="020F0502020204030204" pitchFamily="34" charset="0"/>
+                        <a:ea typeface="Calibri" panose="020F0502020204030204" pitchFamily="34" charset="0"/>
+                        <a:cs typeface="Times New Roman" panose="02020603050405020304" pitchFamily="18" charset="0"/>
+                      </a:endParaRPr>
+                    </a:p>
+                  </a:txBody>
+                  <a:tcPr marL="68580" marR="68580" marT="0" marB="0" anchor="ctr"/>
+                </a:tc>
+                <a:tc>
+                  <a:txBody>
+                    <a:bodyPr/>
+                    <a:lstStyle/>
+                    <a:p>
+                      <a:pPr marL="0" marR="0" algn="ctr">
+                        <a:lnSpc>
+                          <a:spcPct val="115000"/>
+                        </a:lnSpc>
+                        <a:spcBef>
+                          <a:spcPts val="0"/>
+                        </a:spcBef>
+                        <a:spcAft>
+                          <a:spcPts val="0"/>
+                        </a:spcAft>
+                      </a:pPr>
+                      <a:r>
+                        <a:rPr lang="en-US" sz="2000" dirty="0">
+                          <a:effectLst/>
+                        </a:rPr>
+                        <a:t>0.02</a:t>
+                      </a:r>
+                      <a:endParaRPr lang="en-US" sz="2000" dirty="0">
+                        <a:effectLst/>
+                        <a:latin typeface="Calibri" panose="020F0502020204030204" pitchFamily="34" charset="0"/>
+                        <a:ea typeface="Calibri" panose="020F0502020204030204" pitchFamily="34" charset="0"/>
+                        <a:cs typeface="Times New Roman" panose="02020603050405020304" pitchFamily="18" charset="0"/>
+                      </a:endParaRPr>
+                    </a:p>
+                  </a:txBody>
+                  <a:tcPr marL="68580" marR="68580" marT="0" marB="0" anchor="ctr"/>
+                </a:tc>
+                <a:extLst>
+                  <a:ext uri="{0D108BD9-81ED-4DB2-BD59-A6C34878D82A}">
+                    <a16:rowId xmlns:a16="http://schemas.microsoft.com/office/drawing/2014/main" val="2634393039"/>
+                  </a:ext>
+                </a:extLst>
+              </a:tr>
+            </a:tbl>
+          </a:graphicData>
+        </a:graphic>
+      </p:graphicFrame>
     </p:spTree>
     <p:extLst>
       <p:ext uri="{BB962C8B-B14F-4D97-AF65-F5344CB8AC3E}">
@@ -10630,7 +11415,7 @@
 </p:sld>
 </file>
 
-<file path=ppt/slides/slide14.xml><?xml version="1.0" encoding="utf-8"?>
+<file path=ppt/slides/slide16.xml><?xml version="1.0" encoding="utf-8"?>
 <p:sld xmlns:a="http://schemas.openxmlformats.org/drawingml/2006/main" xmlns:r="http://schemas.openxmlformats.org/officeDocument/2006/relationships" xmlns:p="http://schemas.openxmlformats.org/presentationml/2006/main">
   <p:cSld>
     <p:spTree>
@@ -12227,7 +13012,7 @@
 </p:sld>
 </file>
 
-<file path=ppt/slides/slide15.xml><?xml version="1.0" encoding="utf-8"?>
+<file path=ppt/slides/slide17.xml><?xml version="1.0" encoding="utf-8"?>
 <p:sld xmlns:a="http://schemas.openxmlformats.org/drawingml/2006/main" xmlns:r="http://schemas.openxmlformats.org/officeDocument/2006/relationships" xmlns:p="http://schemas.openxmlformats.org/presentationml/2006/main">
   <p:cSld>
     <p:spTree>
@@ -15400,7 +16185,7 @@
 </p:sld>
 </file>
 
-<file path=ppt/slides/slide16.xml><?xml version="1.0" encoding="utf-8"?>
+<file path=ppt/slides/slide18.xml><?xml version="1.0" encoding="utf-8"?>
 <p:sld xmlns:a="http://schemas.openxmlformats.org/drawingml/2006/main" xmlns:r="http://schemas.openxmlformats.org/officeDocument/2006/relationships" xmlns:p="http://schemas.openxmlformats.org/presentationml/2006/main">
   <p:cSld>
     <p:spTree>
@@ -18573,7 +19358,7 @@
 </p:sld>
 </file>
 
-<file path=ppt/slides/slide17.xml><?xml version="1.0" encoding="utf-8"?>
+<file path=ppt/slides/slide19.xml><?xml version="1.0" encoding="utf-8"?>
 <p:sld xmlns:a="http://schemas.openxmlformats.org/drawingml/2006/main" xmlns:r="http://schemas.openxmlformats.org/officeDocument/2006/relationships" xmlns:p="http://schemas.openxmlformats.org/presentationml/2006/main">
   <p:cSld>
     <p:spTree>
@@ -19222,182 +20007,6 @@
     <p:extLst>
       <p:ext uri="{BB962C8B-B14F-4D97-AF65-F5344CB8AC3E}">
         <p14:creationId xmlns:p14="http://schemas.microsoft.com/office/powerpoint/2010/main" val="3085506390"/>
-      </p:ext>
-    </p:extLst>
-  </p:cSld>
-  <p:clrMapOvr>
-    <a:masterClrMapping/>
-  </p:clrMapOvr>
-</p:sld>
-</file>
-
-<file path=ppt/slides/slide18.xml><?xml version="1.0" encoding="utf-8"?>
-<p:sld xmlns:a="http://schemas.openxmlformats.org/drawingml/2006/main" xmlns:r="http://schemas.openxmlformats.org/officeDocument/2006/relationships" xmlns:p="http://schemas.openxmlformats.org/presentationml/2006/main">
-  <p:cSld>
-    <p:spTree>
-      <p:nvGrpSpPr>
-        <p:cNvPr id="1" name=""/>
-        <p:cNvGrpSpPr/>
-        <p:nvPr/>
-      </p:nvGrpSpPr>
-      <p:grpSpPr>
-        <a:xfrm>
-          <a:off x="0" y="0"/>
-          <a:ext cx="0" cy="0"/>
-          <a:chOff x="0" y="0"/>
-          <a:chExt cx="0" cy="0"/>
-        </a:xfrm>
-      </p:grpSpPr>
-      <p:sp>
-        <p:nvSpPr>
-          <p:cNvPr id="2" name="Title 1">
-            <a:extLst>
-              <a:ext uri="{FF2B5EF4-FFF2-40B4-BE49-F238E27FC236}">
-                <a16:creationId xmlns:a16="http://schemas.microsoft.com/office/drawing/2014/main" id="{1A13B7C9-8ADB-465F-99BE-D77E9D263940}"/>
-              </a:ext>
-            </a:extLst>
-          </p:cNvPr>
-          <p:cNvSpPr>
-            <a:spLocks noGrp="1"/>
-          </p:cNvSpPr>
-          <p:nvPr>
-            <p:ph type="title"/>
-          </p:nvPr>
-        </p:nvSpPr>
-        <p:spPr/>
-        <p:txBody>
-          <a:bodyPr/>
-          <a:lstStyle/>
-          <a:p>
-            <a:r>
-              <a:rPr lang="en-US" dirty="0"/>
-              <a:t>Potential future scenarios</a:t>
-            </a:r>
-          </a:p>
-        </p:txBody>
-      </p:sp>
-      <p:sp>
-        <p:nvSpPr>
-          <p:cNvPr id="3" name="Content Placeholder 2">
-            <a:extLst>
-              <a:ext uri="{FF2B5EF4-FFF2-40B4-BE49-F238E27FC236}">
-                <a16:creationId xmlns:a16="http://schemas.microsoft.com/office/drawing/2014/main" id="{F1BC5C35-F43D-4071-B989-92C45D16933C}"/>
-              </a:ext>
-            </a:extLst>
-          </p:cNvPr>
-          <p:cNvSpPr>
-            <a:spLocks noGrp="1"/>
-          </p:cNvSpPr>
-          <p:nvPr>
-            <p:ph idx="1"/>
-          </p:nvPr>
-        </p:nvSpPr>
-        <p:spPr/>
-        <p:txBody>
-          <a:bodyPr>
-            <a:normAutofit fontScale="92500" lnSpcReduction="10000"/>
-          </a:bodyPr>
-          <a:lstStyle/>
-          <a:p>
-            <a:r>
-              <a:rPr lang="en-US" dirty="0"/>
-              <a:t>Scenario 1 – Status quo: No change in ambient noise level or annual temperature range</a:t>
-            </a:r>
-          </a:p>
-          <a:p>
-            <a:endParaRPr lang="en-US" dirty="0"/>
-          </a:p>
-          <a:p>
-            <a:r>
-              <a:rPr lang="en-US" dirty="0"/>
-              <a:t>Scenario 2 – Noise reduction: Climate change leads to an increase in average annual temperature range of 0.5 </a:t>
-            </a:r>
-            <a:r>
-              <a:rPr lang="en-US" i="1" dirty="0"/>
-              <a:t>°C, but management efforts to restrict development leads to a decrease in ambient noise level of 2 decibels.</a:t>
-            </a:r>
-          </a:p>
-          <a:p>
-            <a:endParaRPr lang="en-US" dirty="0"/>
-          </a:p>
-          <a:p>
-            <a:r>
-              <a:rPr lang="en-US" dirty="0"/>
-              <a:t>Scenario 3 – Noise increase: Climate change leads to an increase in average annual temperature range of 0.5 </a:t>
-            </a:r>
-            <a:r>
-              <a:rPr lang="en-US" i="1" dirty="0"/>
-              <a:t>°C, and further development leads to an increase in ambient noise level of 2 decibels. </a:t>
-            </a:r>
-            <a:endParaRPr lang="en-US" dirty="0"/>
-          </a:p>
-          <a:p>
-            <a:endParaRPr lang="en-US" dirty="0"/>
-          </a:p>
-        </p:txBody>
-      </p:sp>
-    </p:spTree>
-    <p:extLst>
-      <p:ext uri="{BB962C8B-B14F-4D97-AF65-F5344CB8AC3E}">
-        <p14:creationId xmlns:p14="http://schemas.microsoft.com/office/powerpoint/2010/main" val="124965828"/>
-      </p:ext>
-    </p:extLst>
-  </p:cSld>
-  <p:clrMapOvr>
-    <a:masterClrMapping/>
-  </p:clrMapOvr>
-</p:sld>
-</file>
-
-<file path=ppt/slides/slide19.xml><?xml version="1.0" encoding="utf-8"?>
-<p:sld xmlns:a="http://schemas.openxmlformats.org/drawingml/2006/main" xmlns:r="http://schemas.openxmlformats.org/officeDocument/2006/relationships" xmlns:p="http://schemas.openxmlformats.org/presentationml/2006/main">
-  <p:cSld>
-    <p:spTree>
-      <p:nvGrpSpPr>
-        <p:cNvPr id="1" name=""/>
-        <p:cNvGrpSpPr/>
-        <p:nvPr/>
-      </p:nvGrpSpPr>
-      <p:grpSpPr>
-        <a:xfrm>
-          <a:off x="0" y="0"/>
-          <a:ext cx="0" cy="0"/>
-          <a:chOff x="0" y="0"/>
-          <a:chExt cx="0" cy="0"/>
-        </a:xfrm>
-      </p:grpSpPr>
-      <p:pic>
-        <p:nvPicPr>
-          <p:cNvPr id="4" name="Picture 3">
-            <a:extLst>
-              <a:ext uri="{FF2B5EF4-FFF2-40B4-BE49-F238E27FC236}">
-                <a16:creationId xmlns:a16="http://schemas.microsoft.com/office/drawing/2014/main" id="{0410D0A0-351D-4E1F-A32C-F955EA4C8442}"/>
-              </a:ext>
-            </a:extLst>
-          </p:cNvPr>
-          <p:cNvPicPr/>
-          <p:nvPr/>
-        </p:nvPicPr>
-        <p:blipFill>
-          <a:blip r:embed="rId2"/>
-          <a:stretch>
-            <a:fillRect/>
-          </a:stretch>
-        </p:blipFill>
-        <p:spPr>
-          <a:xfrm>
-            <a:off x="909782" y="656647"/>
-            <a:ext cx="10372436" cy="5544705"/>
-          </a:xfrm>
-          <a:prstGeom prst="rect">
-            <a:avLst/>
-          </a:prstGeom>
-        </p:spPr>
-      </p:pic>
-    </p:spTree>
-    <p:extLst>
-      <p:ext uri="{BB962C8B-B14F-4D97-AF65-F5344CB8AC3E}">
-        <p14:creationId xmlns:p14="http://schemas.microsoft.com/office/powerpoint/2010/main" val="2839831614"/>
       </p:ext>
     </p:extLst>
   </p:cSld>
@@ -20073,12 +20682,453 @@
           <a:chExt cx="0" cy="0"/>
         </a:xfrm>
       </p:grpSpPr>
+      <p:sp>
+        <p:nvSpPr>
+          <p:cNvPr id="2" name="Title 1">
+            <a:extLst>
+              <a:ext uri="{FF2B5EF4-FFF2-40B4-BE49-F238E27FC236}">
+                <a16:creationId xmlns:a16="http://schemas.microsoft.com/office/drawing/2014/main" id="{1A13B7C9-8ADB-465F-99BE-D77E9D263940}"/>
+              </a:ext>
+            </a:extLst>
+          </p:cNvPr>
+          <p:cNvSpPr>
+            <a:spLocks noGrp="1"/>
+          </p:cNvSpPr>
+          <p:nvPr>
+            <p:ph type="title"/>
+          </p:nvPr>
+        </p:nvSpPr>
+        <p:spPr/>
+        <p:txBody>
+          <a:bodyPr/>
+          <a:lstStyle/>
+          <a:p>
+            <a:r>
+              <a:rPr lang="en-US" dirty="0"/>
+              <a:t>Potential future scenarios</a:t>
+            </a:r>
+          </a:p>
+        </p:txBody>
+      </p:sp>
+      <p:sp>
+        <p:nvSpPr>
+          <p:cNvPr id="3" name="Content Placeholder 2">
+            <a:extLst>
+              <a:ext uri="{FF2B5EF4-FFF2-40B4-BE49-F238E27FC236}">
+                <a16:creationId xmlns:a16="http://schemas.microsoft.com/office/drawing/2014/main" id="{F1BC5C35-F43D-4071-B989-92C45D16933C}"/>
+              </a:ext>
+            </a:extLst>
+          </p:cNvPr>
+          <p:cNvSpPr>
+            <a:spLocks noGrp="1"/>
+          </p:cNvSpPr>
+          <p:nvPr>
+            <p:ph idx="1"/>
+          </p:nvPr>
+        </p:nvSpPr>
+        <p:spPr/>
+        <p:txBody>
+          <a:bodyPr>
+            <a:normAutofit fontScale="92500"/>
+          </a:bodyPr>
+          <a:lstStyle/>
+          <a:p>
+            <a:r>
+              <a:rPr lang="en-US" dirty="0"/>
+              <a:t>Scenario 1 – Status quo: No change in ambient noise level or annual temperature range</a:t>
+            </a:r>
+          </a:p>
+          <a:p>
+            <a:endParaRPr lang="en-US" dirty="0"/>
+          </a:p>
+          <a:p>
+            <a:r>
+              <a:rPr lang="en-US" dirty="0"/>
+              <a:t>Scenario 2 – </a:t>
+            </a:r>
+            <a:r>
+              <a:rPr lang="en-US" dirty="0">
+                <a:latin typeface="Calibri" panose="020F0502020204030204" pitchFamily="34" charset="0"/>
+                <a:ea typeface="Calibri" panose="020F0502020204030204" pitchFamily="34" charset="0"/>
+              </a:rPr>
+              <a:t>Climate change only: Climate change leads to an </a:t>
+            </a:r>
+            <a:r>
+              <a:rPr lang="en-US" b="1" dirty="0">
+                <a:latin typeface="Calibri" panose="020F0502020204030204" pitchFamily="34" charset="0"/>
+                <a:ea typeface="Calibri" panose="020F0502020204030204" pitchFamily="34" charset="0"/>
+              </a:rPr>
+              <a:t>increase in average annual temperature range of 10</a:t>
+            </a:r>
+            <a:r>
+              <a:rPr lang="en-US" b="1" dirty="0">
+                <a:solidFill>
+                  <a:srgbClr val="000000"/>
+                </a:solidFill>
+                <a:latin typeface="Calibri" panose="020F0502020204030204" pitchFamily="34" charset="0"/>
+                <a:ea typeface="Calibri" panose="020F0502020204030204" pitchFamily="34" charset="0"/>
+              </a:rPr>
+              <a:t>°C</a:t>
+            </a:r>
+            <a:r>
+              <a:rPr lang="en-US" dirty="0">
+                <a:solidFill>
+                  <a:srgbClr val="000000"/>
+                </a:solidFill>
+                <a:latin typeface="Calibri" panose="020F0502020204030204" pitchFamily="34" charset="0"/>
+                <a:ea typeface="Calibri" panose="020F0502020204030204" pitchFamily="34" charset="0"/>
+              </a:rPr>
+              <a:t>, but management efforts to restrict development leads to </a:t>
+            </a:r>
+            <a:r>
+              <a:rPr lang="en-US" b="1" dirty="0">
+                <a:solidFill>
+                  <a:srgbClr val="000000"/>
+                </a:solidFill>
+                <a:latin typeface="Calibri" panose="020F0502020204030204" pitchFamily="34" charset="0"/>
+                <a:ea typeface="Calibri" panose="020F0502020204030204" pitchFamily="34" charset="0"/>
+              </a:rPr>
+              <a:t>no change in the ambient noise level</a:t>
+            </a:r>
+            <a:r>
+              <a:rPr lang="en-US" dirty="0">
+                <a:solidFill>
+                  <a:srgbClr val="000000"/>
+                </a:solidFill>
+                <a:latin typeface="Calibri" panose="020F0502020204030204" pitchFamily="34" charset="0"/>
+                <a:ea typeface="Calibri" panose="020F0502020204030204" pitchFamily="34" charset="0"/>
+              </a:rPr>
+              <a:t>.</a:t>
+            </a:r>
+            <a:endParaRPr lang="en-US" dirty="0"/>
+          </a:p>
+          <a:p>
+            <a:endParaRPr lang="en-US" dirty="0"/>
+          </a:p>
+          <a:p>
+            <a:r>
+              <a:rPr lang="en-US" dirty="0"/>
+              <a:t>Scenario 3 – </a:t>
+            </a:r>
+            <a:r>
+              <a:rPr lang="en-US" dirty="0">
+                <a:latin typeface="Calibri" panose="020F0502020204030204" pitchFamily="34" charset="0"/>
+                <a:ea typeface="Calibri" panose="020F0502020204030204" pitchFamily="34" charset="0"/>
+              </a:rPr>
+              <a:t>Climate change and noise increase: Climate change leads to an </a:t>
+            </a:r>
+            <a:r>
+              <a:rPr lang="en-US" b="1" dirty="0">
+                <a:latin typeface="Calibri" panose="020F0502020204030204" pitchFamily="34" charset="0"/>
+                <a:ea typeface="Calibri" panose="020F0502020204030204" pitchFamily="34" charset="0"/>
+              </a:rPr>
+              <a:t>increase in average annual temperature range of 10 </a:t>
+            </a:r>
+            <a:r>
+              <a:rPr lang="en-US" b="1" dirty="0">
+                <a:solidFill>
+                  <a:srgbClr val="000000"/>
+                </a:solidFill>
+                <a:latin typeface="Calibri" panose="020F0502020204030204" pitchFamily="34" charset="0"/>
+                <a:ea typeface="Calibri" panose="020F0502020204030204" pitchFamily="34" charset="0"/>
+              </a:rPr>
+              <a:t>°C</a:t>
+            </a:r>
+            <a:r>
+              <a:rPr lang="en-US" dirty="0">
+                <a:solidFill>
+                  <a:srgbClr val="000000"/>
+                </a:solidFill>
+                <a:latin typeface="Calibri" panose="020F0502020204030204" pitchFamily="34" charset="0"/>
+                <a:ea typeface="Calibri" panose="020F0502020204030204" pitchFamily="34" charset="0"/>
+              </a:rPr>
+              <a:t>, and further development leads to an </a:t>
+            </a:r>
+            <a:r>
+              <a:rPr lang="en-US" b="1" dirty="0">
+                <a:solidFill>
+                  <a:srgbClr val="000000"/>
+                </a:solidFill>
+                <a:latin typeface="Calibri" panose="020F0502020204030204" pitchFamily="34" charset="0"/>
+                <a:ea typeface="Calibri" panose="020F0502020204030204" pitchFamily="34" charset="0"/>
+              </a:rPr>
+              <a:t>increase in ambient noise level of 40 decibels</a:t>
+            </a:r>
+            <a:r>
+              <a:rPr lang="en-US" i="1" dirty="0">
+                <a:solidFill>
+                  <a:srgbClr val="000000"/>
+                </a:solidFill>
+                <a:latin typeface="Calibri" panose="020F0502020204030204" pitchFamily="34" charset="0"/>
+                <a:ea typeface="Calibri" panose="020F0502020204030204" pitchFamily="34" charset="0"/>
+              </a:rPr>
+              <a:t>. </a:t>
+            </a:r>
+            <a:endParaRPr lang="en-US" dirty="0"/>
+          </a:p>
+          <a:p>
+            <a:endParaRPr lang="en-US" dirty="0"/>
+          </a:p>
+        </p:txBody>
+      </p:sp>
+    </p:spTree>
+    <p:extLst>
+      <p:ext uri="{BB962C8B-B14F-4D97-AF65-F5344CB8AC3E}">
+        <p14:creationId xmlns:p14="http://schemas.microsoft.com/office/powerpoint/2010/main" val="124965828"/>
+      </p:ext>
+    </p:extLst>
+  </p:cSld>
+  <p:clrMapOvr>
+    <a:masterClrMapping/>
+  </p:clrMapOvr>
+</p:sld>
+</file>
+
+<file path=ppt/slides/slide21.xml><?xml version="1.0" encoding="utf-8"?>
+<p:sld xmlns:a="http://schemas.openxmlformats.org/drawingml/2006/main" xmlns:r="http://schemas.openxmlformats.org/officeDocument/2006/relationships" xmlns:p="http://schemas.openxmlformats.org/presentationml/2006/main">
+  <p:cSld>
+    <p:spTree>
+      <p:nvGrpSpPr>
+        <p:cNvPr id="1" name=""/>
+        <p:cNvGrpSpPr/>
+        <p:nvPr/>
+      </p:nvGrpSpPr>
+      <p:grpSpPr>
+        <a:xfrm>
+          <a:off x="0" y="0"/>
+          <a:ext cx="0" cy="0"/>
+          <a:chOff x="0" y="0"/>
+          <a:chExt cx="0" cy="0"/>
+        </a:xfrm>
+      </p:grpSpPr>
+      <p:pic>
+        <p:nvPicPr>
+          <p:cNvPr id="6" name="Picture 5">
+            <a:extLst>
+              <a:ext uri="{FF2B5EF4-FFF2-40B4-BE49-F238E27FC236}">
+                <a16:creationId xmlns:a16="http://schemas.microsoft.com/office/drawing/2014/main" id="{29A680D3-27D6-4BE7-9C16-F002CD0EF6F1}"/>
+              </a:ext>
+            </a:extLst>
+          </p:cNvPr>
+          <p:cNvPicPr/>
+          <p:nvPr/>
+        </p:nvPicPr>
+        <p:blipFill>
+          <a:blip r:embed="rId2"/>
+          <a:stretch>
+            <a:fillRect/>
+          </a:stretch>
+        </p:blipFill>
+        <p:spPr>
+          <a:xfrm>
+            <a:off x="377507" y="663607"/>
+            <a:ext cx="5373053" cy="2746978"/>
+          </a:xfrm>
+          <a:prstGeom prst="rect">
+            <a:avLst/>
+          </a:prstGeom>
+        </p:spPr>
+      </p:pic>
+      <p:pic>
+        <p:nvPicPr>
+          <p:cNvPr id="7" name="Picture 6">
+            <a:extLst>
+              <a:ext uri="{FF2B5EF4-FFF2-40B4-BE49-F238E27FC236}">
+                <a16:creationId xmlns:a16="http://schemas.microsoft.com/office/drawing/2014/main" id="{D6F65DDC-FA6F-4635-BE9F-29B2D34F772C}"/>
+              </a:ext>
+            </a:extLst>
+          </p:cNvPr>
+          <p:cNvPicPr/>
+          <p:nvPr/>
+        </p:nvPicPr>
+        <p:blipFill>
+          <a:blip r:embed="rId3"/>
+          <a:stretch>
+            <a:fillRect/>
+          </a:stretch>
+        </p:blipFill>
+        <p:spPr>
+          <a:xfrm>
+            <a:off x="6441442" y="663607"/>
+            <a:ext cx="5373053" cy="2757787"/>
+          </a:xfrm>
+          <a:prstGeom prst="rect">
+            <a:avLst/>
+          </a:prstGeom>
+        </p:spPr>
+      </p:pic>
+      <p:pic>
+        <p:nvPicPr>
+          <p:cNvPr id="8" name="Picture 7">
+            <a:extLst>
+              <a:ext uri="{FF2B5EF4-FFF2-40B4-BE49-F238E27FC236}">
+                <a16:creationId xmlns:a16="http://schemas.microsoft.com/office/drawing/2014/main" id="{43BCD776-4766-473E-841D-800F6375C8C4}"/>
+              </a:ext>
+            </a:extLst>
+          </p:cNvPr>
+          <p:cNvPicPr/>
+          <p:nvPr/>
+        </p:nvPicPr>
+        <p:blipFill>
+          <a:blip r:embed="rId4"/>
+          <a:stretch>
+            <a:fillRect/>
+          </a:stretch>
+        </p:blipFill>
+        <p:spPr>
+          <a:xfrm>
+            <a:off x="377507" y="4043680"/>
+            <a:ext cx="5373053" cy="2700655"/>
+          </a:xfrm>
+          <a:prstGeom prst="rect">
+            <a:avLst/>
+          </a:prstGeom>
+        </p:spPr>
+      </p:pic>
+      <p:sp>
+        <p:nvSpPr>
+          <p:cNvPr id="3" name="TextBox 2">
+            <a:extLst>
+              <a:ext uri="{FF2B5EF4-FFF2-40B4-BE49-F238E27FC236}">
+                <a16:creationId xmlns:a16="http://schemas.microsoft.com/office/drawing/2014/main" id="{D5593088-015B-428E-B3A5-17A3F08CDDAF}"/>
+              </a:ext>
+            </a:extLst>
+          </p:cNvPr>
+          <p:cNvSpPr txBox="1"/>
+          <p:nvPr/>
+        </p:nvSpPr>
+        <p:spPr>
+          <a:xfrm>
+            <a:off x="1788160" y="206606"/>
+            <a:ext cx="2235200" cy="369332"/>
+          </a:xfrm>
+          <a:prstGeom prst="rect">
+            <a:avLst/>
+          </a:prstGeom>
+          <a:noFill/>
+        </p:spPr>
+        <p:txBody>
+          <a:bodyPr wrap="square" rtlCol="0">
+            <a:spAutoFit/>
+          </a:bodyPr>
+          <a:lstStyle/>
+          <a:p>
+            <a:pPr algn="ctr"/>
+            <a:r>
+              <a:rPr lang="en-US" b="1" dirty="0"/>
+              <a:t>Scenario 1</a:t>
+            </a:r>
+          </a:p>
+        </p:txBody>
+      </p:sp>
+      <p:sp>
+        <p:nvSpPr>
+          <p:cNvPr id="9" name="TextBox 8">
+            <a:extLst>
+              <a:ext uri="{FF2B5EF4-FFF2-40B4-BE49-F238E27FC236}">
+                <a16:creationId xmlns:a16="http://schemas.microsoft.com/office/drawing/2014/main" id="{EE20AA6C-5BE5-4653-B673-54E989134B5F}"/>
+              </a:ext>
+            </a:extLst>
+          </p:cNvPr>
+          <p:cNvSpPr txBox="1"/>
+          <p:nvPr/>
+        </p:nvSpPr>
+        <p:spPr>
+          <a:xfrm>
+            <a:off x="8371840" y="252438"/>
+            <a:ext cx="2235200" cy="369332"/>
+          </a:xfrm>
+          <a:prstGeom prst="rect">
+            <a:avLst/>
+          </a:prstGeom>
+          <a:noFill/>
+        </p:spPr>
+        <p:txBody>
+          <a:bodyPr wrap="square" rtlCol="0">
+            <a:spAutoFit/>
+          </a:bodyPr>
+          <a:lstStyle/>
+          <a:p>
+            <a:pPr algn="ctr"/>
+            <a:r>
+              <a:rPr lang="en-US" b="1" dirty="0"/>
+              <a:t>Scenario 2</a:t>
+            </a:r>
+          </a:p>
+        </p:txBody>
+      </p:sp>
+      <p:sp>
+        <p:nvSpPr>
+          <p:cNvPr id="10" name="TextBox 9">
+            <a:extLst>
+              <a:ext uri="{FF2B5EF4-FFF2-40B4-BE49-F238E27FC236}">
+                <a16:creationId xmlns:a16="http://schemas.microsoft.com/office/drawing/2014/main" id="{7D037C78-030A-4513-AE6F-F9EAF592860C}"/>
+              </a:ext>
+            </a:extLst>
+          </p:cNvPr>
+          <p:cNvSpPr txBox="1"/>
+          <p:nvPr/>
+        </p:nvSpPr>
+        <p:spPr>
+          <a:xfrm>
+            <a:off x="1767841" y="3630327"/>
+            <a:ext cx="2235200" cy="369332"/>
+          </a:xfrm>
+          <a:prstGeom prst="rect">
+            <a:avLst/>
+          </a:prstGeom>
+          <a:noFill/>
+        </p:spPr>
+        <p:txBody>
+          <a:bodyPr wrap="square" rtlCol="0">
+            <a:spAutoFit/>
+          </a:bodyPr>
+          <a:lstStyle/>
+          <a:p>
+            <a:pPr algn="ctr"/>
+            <a:r>
+              <a:rPr lang="en-US" b="1" dirty="0"/>
+              <a:t>Scenario 3</a:t>
+            </a:r>
+          </a:p>
+        </p:txBody>
+      </p:sp>
+    </p:spTree>
+    <p:extLst>
+      <p:ext uri="{BB962C8B-B14F-4D97-AF65-F5344CB8AC3E}">
+        <p14:creationId xmlns:p14="http://schemas.microsoft.com/office/powerpoint/2010/main" val="2839831614"/>
+      </p:ext>
+    </p:extLst>
+  </p:cSld>
+  <p:clrMapOvr>
+    <a:masterClrMapping/>
+  </p:clrMapOvr>
+</p:sld>
+</file>
+
+<file path=ppt/slides/slide22.xml><?xml version="1.0" encoding="utf-8"?>
+<p:sld xmlns:a="http://schemas.openxmlformats.org/drawingml/2006/main" xmlns:r="http://schemas.openxmlformats.org/officeDocument/2006/relationships" xmlns:p="http://schemas.openxmlformats.org/presentationml/2006/main">
+  <p:cSld>
+    <p:spTree>
+      <p:nvGrpSpPr>
+        <p:cNvPr id="1" name=""/>
+        <p:cNvGrpSpPr/>
+        <p:nvPr/>
+      </p:nvGrpSpPr>
+      <p:grpSpPr>
+        <a:xfrm>
+          <a:off x="0" y="0"/>
+          <a:ext cx="0" cy="0"/>
+          <a:chOff x="0" y="0"/>
+          <a:chExt cx="0" cy="0"/>
+        </a:xfrm>
+      </p:grpSpPr>
       <p:graphicFrame>
         <p:nvGraphicFramePr>
-          <p:cNvPr id="4" name="Table 3">
+          <p:cNvPr id="5" name="Table 4">
             <a:extLst>
               <a:ext uri="{FF2B5EF4-FFF2-40B4-BE49-F238E27FC236}">
-                <a16:creationId xmlns:a16="http://schemas.microsoft.com/office/drawing/2014/main" id="{66C4EF85-8A72-4E98-B432-D2A5F6F2C361}"/>
+                <a16:creationId xmlns:a16="http://schemas.microsoft.com/office/drawing/2014/main" id="{693D437C-A77F-46D9-BE60-0A14804B240A}"/>
               </a:ext>
             </a:extLst>
           </p:cNvPr>
@@ -20088,14 +21138,14 @@
           <p:nvPr>
             <p:extLst>
               <p:ext uri="{D42A27DB-BD31-4B8C-83A1-F6EECF244321}">
-                <p14:modId xmlns:p14="http://schemas.microsoft.com/office/powerpoint/2010/main" val="1867514483"/>
+                <p14:modId xmlns:p14="http://schemas.microsoft.com/office/powerpoint/2010/main" val="3779302255"/>
               </p:ext>
             </p:extLst>
           </p:nvPr>
         </p:nvGraphicFramePr>
         <p:xfrm>
-          <a:off x="350983" y="954858"/>
-          <a:ext cx="11526981" cy="3404706"/>
+          <a:off x="1158240" y="683291"/>
+          <a:ext cx="10078275" cy="3541594"/>
         </p:xfrm>
         <a:graphic>
           <a:graphicData uri="http://schemas.openxmlformats.org/drawingml/2006/table">
@@ -20104,36 +21154,36 @@
                 <a:tableStyleId>{5C22544A-7EE6-4342-B048-85BDC9FD1C3A}</a:tableStyleId>
               </a:tblPr>
               <a:tblGrid>
-                <a:gridCol w="3357498">
+                <a:gridCol w="2659380">
                   <a:extLst>
                     <a:ext uri="{9D8B030D-6E8A-4147-A177-3AD203B41FA5}">
-                      <a16:colId xmlns:a16="http://schemas.microsoft.com/office/drawing/2014/main" val="1096172016"/>
+                      <a16:colId xmlns:a16="http://schemas.microsoft.com/office/drawing/2014/main" val="1367369384"/>
                     </a:ext>
                   </a:extLst>
                 </a:gridCol>
-                <a:gridCol w="2426619">
+                <a:gridCol w="2659380">
                   <a:extLst>
                     <a:ext uri="{9D8B030D-6E8A-4147-A177-3AD203B41FA5}">
-                      <a16:colId xmlns:a16="http://schemas.microsoft.com/office/drawing/2014/main" val="366949790"/>
+                      <a16:colId xmlns:a16="http://schemas.microsoft.com/office/drawing/2014/main" val="3843212259"/>
                     </a:ext>
                   </a:extLst>
                 </a:gridCol>
-                <a:gridCol w="2944245">
+                <a:gridCol w="2100135">
                   <a:extLst>
                     <a:ext uri="{9D8B030D-6E8A-4147-A177-3AD203B41FA5}">
-                      <a16:colId xmlns:a16="http://schemas.microsoft.com/office/drawing/2014/main" val="572833862"/>
+                      <a16:colId xmlns:a16="http://schemas.microsoft.com/office/drawing/2014/main" val="1936545371"/>
                     </a:ext>
                   </a:extLst>
                 </a:gridCol>
-                <a:gridCol w="2798619">
+                <a:gridCol w="2659380">
                   <a:extLst>
                     <a:ext uri="{9D8B030D-6E8A-4147-A177-3AD203B41FA5}">
-                      <a16:colId xmlns:a16="http://schemas.microsoft.com/office/drawing/2014/main" val="1898176705"/>
+                      <a16:colId xmlns:a16="http://schemas.microsoft.com/office/drawing/2014/main" val="4238236171"/>
                     </a:ext>
                   </a:extLst>
                 </a:gridCol>
               </a:tblGrid>
-              <a:tr h="482090">
+              <a:tr h="406441">
                 <a:tc rowSpan="2">
                   <a:txBody>
                     <a:bodyPr/>
@@ -20150,12 +21200,15 @@
                           <a:spcPts val="0"/>
                         </a:spcAft>
                       </a:pPr>
-                      <a:endParaRPr lang="en-US" sz="2400" dirty="0">
-                        <a:effectLst/>
-                        <a:latin typeface="Calibri" panose="020F0502020204030204" pitchFamily="34" charset="0"/>
-                        <a:ea typeface="Calibri" panose="020F0502020204030204" pitchFamily="34" charset="0"/>
-                        <a:cs typeface="Times New Roman" panose="02020603050405020304" pitchFamily="18" charset="0"/>
-                      </a:endParaRPr>
+                      <a:r>
+                        <a:rPr lang="en-US" sz="2400" dirty="0">
+                          <a:effectLst/>
+                          <a:latin typeface="Calibri" panose="020F0502020204030204" pitchFamily="34" charset="0"/>
+                          <a:ea typeface="Calibri" panose="020F0502020204030204" pitchFamily="34" charset="0"/>
+                          <a:cs typeface="Times New Roman" panose="02020603050405020304" pitchFamily="18" charset="0"/>
+                        </a:rPr>
+                        <a:t>Group</a:t>
+                      </a:r>
                     </a:p>
                   </a:txBody>
                   <a:tcPr marL="68580" marR="68580" marT="0" marB="0" anchor="ctr"/>
@@ -20177,12 +21230,12 @@
                         </a:spcAft>
                       </a:pPr>
                       <a:r>
-                        <a:rPr lang="en-US" sz="2400" dirty="0">
+                        <a:rPr lang="en-US" sz="2400">
                           <a:effectLst/>
                         </a:rPr>
-                        <a:t>Extinction probability under each scenario</a:t>
+                        <a:t>Extinction probability</a:t>
                       </a:r>
-                      <a:endParaRPr lang="en-US" sz="2400" dirty="0">
+                      <a:endParaRPr lang="en-US" sz="2400">
                         <a:effectLst/>
                         <a:latin typeface="Calibri" panose="020F0502020204030204" pitchFamily="34" charset="0"/>
                         <a:ea typeface="Calibri" panose="020F0502020204030204" pitchFamily="34" charset="0"/>
@@ -20214,11 +21267,11 @@
                 </a:tc>
                 <a:extLst>
                   <a:ext uri="{0D108BD9-81ED-4DB2-BD59-A6C34878D82A}">
-                    <a16:rowId xmlns:a16="http://schemas.microsoft.com/office/drawing/2014/main" val="303551863"/>
+                    <a16:rowId xmlns:a16="http://schemas.microsoft.com/office/drawing/2014/main" val="1127194948"/>
                   </a:ext>
                 </a:extLst>
               </a:tr>
-              <a:tr h="994256">
+              <a:tr h="1480975">
                 <a:tc vMerge="1">
                   <a:txBody>
                     <a:bodyPr/>
@@ -20246,12 +21299,12 @@
                         </a:spcAft>
                       </a:pPr>
                       <a:r>
-                        <a:rPr lang="en-US" sz="2400" b="1" dirty="0">
+                        <a:rPr lang="en-US" sz="2400">
                           <a:effectLst/>
                         </a:rPr>
                         <a:t>Status quo</a:t>
                       </a:r>
-                      <a:endParaRPr lang="en-US" sz="2400" b="1" dirty="0">
+                      <a:endParaRPr lang="en-US" sz="2400">
                         <a:effectLst/>
                         <a:latin typeface="Calibri" panose="020F0502020204030204" pitchFamily="34" charset="0"/>
                         <a:ea typeface="Calibri" panose="020F0502020204030204" pitchFamily="34" charset="0"/>
@@ -20278,25 +21331,20 @@
                         </a:spcAft>
                       </a:pPr>
                       <a:r>
-                        <a:rPr lang="en-US" sz="2400" b="1" dirty="0">
+                        <a:rPr lang="en-US" sz="2400">
                           <a:effectLst/>
                         </a:rPr>
-                        <a:t>Noise reduction</a:t>
+                        <a:t>Climate change</a:t>
                       </a:r>
-                      <a:r>
-                        <a:rPr lang="en-US" sz="2400" b="1" dirty="0">
-                          <a:effectLst/>
-                          <a:latin typeface="Calibri" panose="020F0502020204030204" pitchFamily="34" charset="0"/>
-                          <a:cs typeface="Times New Roman" panose="02020603050405020304" pitchFamily="18" charset="0"/>
-                        </a:rPr>
-                        <a:t> &amp; climate change</a:t>
-                      </a:r>
-                      <a:endParaRPr lang="en-US" sz="2400" b="1" dirty="0">
+                      <a:endParaRPr lang="en-US" sz="2400">
                         <a:effectLst/>
+                        <a:latin typeface="Calibri" panose="020F0502020204030204" pitchFamily="34" charset="0"/>
+                        <a:ea typeface="Calibri" panose="020F0502020204030204" pitchFamily="34" charset="0"/>
+                        <a:cs typeface="Times New Roman" panose="02020603050405020304" pitchFamily="18" charset="0"/>
                       </a:endParaRPr>
                     </a:p>
                   </a:txBody>
-                  <a:tcPr marL="68580" marR="68580" marT="0" marB="0"/>
+                  <a:tcPr marL="68580" marR="68580" marT="0" marB="0" anchor="ctr"/>
                 </a:tc>
                 <a:tc>
                   <a:txBody>
@@ -20315,12 +21363,12 @@
                         </a:spcAft>
                       </a:pPr>
                       <a:r>
-                        <a:rPr lang="en-US" sz="2400" b="1" dirty="0">
+                        <a:rPr lang="en-US" sz="2400">
                           <a:effectLst/>
                         </a:rPr>
-                        <a:t>Noise increase &amp; climate change</a:t>
+                        <a:t>Climate change and noise increase</a:t>
                       </a:r>
-                      <a:endParaRPr lang="en-US" sz="2400" b="1" dirty="0">
+                      <a:endParaRPr lang="en-US" sz="2400">
                         <a:effectLst/>
                         <a:latin typeface="Calibri" panose="020F0502020204030204" pitchFamily="34" charset="0"/>
                         <a:ea typeface="Calibri" panose="020F0502020204030204" pitchFamily="34" charset="0"/>
@@ -20328,15 +21376,15 @@
                       </a:endParaRPr>
                     </a:p>
                   </a:txBody>
-                  <a:tcPr marL="68580" marR="68580" marT="0" marB="0"/>
+                  <a:tcPr marL="68580" marR="68580" marT="0" marB="0" anchor="ctr"/>
                 </a:tc>
                 <a:extLst>
                   <a:ext uri="{0D108BD9-81ED-4DB2-BD59-A6C34878D82A}">
-                    <a16:rowId xmlns:a16="http://schemas.microsoft.com/office/drawing/2014/main" val="1359577834"/>
+                    <a16:rowId xmlns:a16="http://schemas.microsoft.com/office/drawing/2014/main" val="3078957251"/>
                   </a:ext>
                 </a:extLst>
               </a:tr>
-              <a:tr h="482090">
+              <a:tr h="406441">
                 <a:tc>
                   <a:txBody>
                     <a:bodyPr/>
@@ -20389,7 +21437,7 @@
                         <a:rPr lang="en-US" sz="2400">
                           <a:effectLst/>
                         </a:rPr>
-                        <a:t>0.21</a:t>
+                        <a:t>0.08</a:t>
                       </a:r>
                       <a:endParaRPr lang="en-US" sz="2400">
                         <a:effectLst/>
@@ -20421,7 +21469,7 @@
                         <a:rPr lang="en-US" sz="2400">
                           <a:effectLst/>
                         </a:rPr>
-                        <a:t>0.00</a:t>
+                        <a:t>0.17</a:t>
                       </a:r>
                       <a:endParaRPr lang="en-US" sz="2400">
                         <a:effectLst/>
@@ -20431,7 +21479,7 @@
                       </a:endParaRPr>
                     </a:p>
                   </a:txBody>
-                  <a:tcPr marL="68580" marR="68580" marT="0" marB="0"/>
+                  <a:tcPr marL="68580" marR="68580" marT="0" marB="0" anchor="ctr"/>
                 </a:tc>
                 <a:tc>
                   <a:txBody>
@@ -20453,7 +21501,7 @@
                         <a:rPr lang="en-US" sz="2400">
                           <a:effectLst/>
                         </a:rPr>
-                        <a:t>0.57</a:t>
+                        <a:t>0.46</a:t>
                       </a:r>
                       <a:endParaRPr lang="en-US" sz="2400">
                         <a:effectLst/>
@@ -20463,15 +21511,15 @@
                       </a:endParaRPr>
                     </a:p>
                   </a:txBody>
-                  <a:tcPr marL="68580" marR="68580" marT="0" marB="0"/>
+                  <a:tcPr marL="68580" marR="68580" marT="0" marB="0" anchor="ctr"/>
                 </a:tc>
                 <a:extLst>
                   <a:ext uri="{0D108BD9-81ED-4DB2-BD59-A6C34878D82A}">
-                    <a16:rowId xmlns:a16="http://schemas.microsoft.com/office/drawing/2014/main" val="1280772813"/>
+                    <a16:rowId xmlns:a16="http://schemas.microsoft.com/office/drawing/2014/main" val="1433314963"/>
                   </a:ext>
                 </a:extLst>
               </a:tr>
-              <a:tr h="482090">
+              <a:tr h="406441">
                 <a:tc>
                   <a:txBody>
                     <a:bodyPr/>
@@ -20521,115 +21569,12 @@
                         </a:spcAft>
                       </a:pPr>
                       <a:r>
-                        <a:rPr lang="en-US" sz="2400">
+                        <a:rPr lang="en-US" sz="2400" dirty="0">
                           <a:effectLst/>
                         </a:rPr>
-                        <a:t>0.37</a:t>
+                        <a:t>0.16</a:t>
                       </a:r>
-                      <a:endParaRPr lang="en-US" sz="2400">
-                        <a:effectLst/>
-                        <a:latin typeface="Calibri" panose="020F0502020204030204" pitchFamily="34" charset="0"/>
-                        <a:ea typeface="Calibri" panose="020F0502020204030204" pitchFamily="34" charset="0"/>
-                        <a:cs typeface="Times New Roman" panose="02020603050405020304" pitchFamily="18" charset="0"/>
-                      </a:endParaRPr>
-                    </a:p>
-                  </a:txBody>
-                  <a:tcPr marL="68580" marR="68580" marT="0" marB="0" anchor="ctr"/>
-                </a:tc>
-                <a:tc>
-                  <a:txBody>
-                    <a:bodyPr/>
-                    <a:lstStyle/>
-                    <a:p>
-                      <a:pPr marL="0" marR="0" algn="ctr">
-                        <a:lnSpc>
-                          <a:spcPct val="115000"/>
-                        </a:lnSpc>
-                        <a:spcBef>
-                          <a:spcPts val="0"/>
-                        </a:spcBef>
-                        <a:spcAft>
-                          <a:spcPts val="0"/>
-                        </a:spcAft>
-                      </a:pPr>
-                      <a:r>
-                        <a:rPr lang="en-US" sz="2400">
-                          <a:effectLst/>
-                        </a:rPr>
-                        <a:t>0.014</a:t>
-                      </a:r>
-                      <a:endParaRPr lang="en-US" sz="2400">
-                        <a:effectLst/>
-                        <a:latin typeface="Calibri" panose="020F0502020204030204" pitchFamily="34" charset="0"/>
-                        <a:ea typeface="Calibri" panose="020F0502020204030204" pitchFamily="34" charset="0"/>
-                        <a:cs typeface="Times New Roman" panose="02020603050405020304" pitchFamily="18" charset="0"/>
-                      </a:endParaRPr>
-                    </a:p>
-                  </a:txBody>
-                  <a:tcPr marL="68580" marR="68580" marT="0" marB="0"/>
-                </a:tc>
-                <a:tc>
-                  <a:txBody>
-                    <a:bodyPr/>
-                    <a:lstStyle/>
-                    <a:p>
-                      <a:pPr marL="0" marR="0" algn="ctr">
-                        <a:lnSpc>
-                          <a:spcPct val="115000"/>
-                        </a:lnSpc>
-                        <a:spcBef>
-                          <a:spcPts val="0"/>
-                        </a:spcBef>
-                        <a:spcAft>
-                          <a:spcPts val="0"/>
-                        </a:spcAft>
-                      </a:pPr>
-                      <a:r>
-                        <a:rPr lang="en-US" sz="2400">
-                          <a:effectLst/>
-                        </a:rPr>
-                        <a:t>0.67</a:t>
-                      </a:r>
-                      <a:endParaRPr lang="en-US" sz="2400">
-                        <a:effectLst/>
-                        <a:latin typeface="Calibri" panose="020F0502020204030204" pitchFamily="34" charset="0"/>
-                        <a:ea typeface="Calibri" panose="020F0502020204030204" pitchFamily="34" charset="0"/>
-                        <a:cs typeface="Times New Roman" panose="02020603050405020304" pitchFamily="18" charset="0"/>
-                      </a:endParaRPr>
-                    </a:p>
-                  </a:txBody>
-                  <a:tcPr marL="68580" marR="68580" marT="0" marB="0"/>
-                </a:tc>
-                <a:extLst>
-                  <a:ext uri="{0D108BD9-81ED-4DB2-BD59-A6C34878D82A}">
-                    <a16:rowId xmlns:a16="http://schemas.microsoft.com/office/drawing/2014/main" val="4251273775"/>
-                  </a:ext>
-                </a:extLst>
-              </a:tr>
-              <a:tr h="482090">
-                <a:tc>
-                  <a:txBody>
-                    <a:bodyPr/>
-                    <a:lstStyle/>
-                    <a:p>
-                      <a:pPr marL="0" marR="0" algn="ctr">
-                        <a:lnSpc>
-                          <a:spcPct val="115000"/>
-                        </a:lnSpc>
-                        <a:spcBef>
-                          <a:spcPts val="0"/>
-                        </a:spcBef>
-                        <a:spcAft>
-                          <a:spcPts val="0"/>
-                        </a:spcAft>
-                      </a:pPr>
-                      <a:r>
-                        <a:rPr lang="en-US" sz="2400">
-                          <a:effectLst/>
-                        </a:rPr>
-                        <a:t>Paradise Palms</a:t>
-                      </a:r>
-                      <a:endParaRPr lang="en-US" sz="2400">
+                      <a:endParaRPr lang="en-US" sz="2400" dirty="0">
                         <a:effectLst/>
                         <a:latin typeface="Calibri" panose="020F0502020204030204" pitchFamily="34" charset="0"/>
                         <a:ea typeface="Calibri" panose="020F0502020204030204" pitchFamily="34" charset="0"/>
@@ -20691,7 +21636,7 @@
                         <a:rPr lang="en-US" sz="2400">
                           <a:effectLst/>
                         </a:rPr>
-                        <a:t>0.001</a:t>
+                        <a:t>0.50</a:t>
                       </a:r>
                       <a:endParaRPr lang="en-US" sz="2400">
                         <a:effectLst/>
@@ -20701,7 +21646,110 @@
                       </a:endParaRPr>
                     </a:p>
                   </a:txBody>
-                  <a:tcPr marL="68580" marR="68580" marT="0" marB="0"/>
+                  <a:tcPr marL="68580" marR="68580" marT="0" marB="0" anchor="ctr"/>
+                </a:tc>
+                <a:extLst>
+                  <a:ext uri="{0D108BD9-81ED-4DB2-BD59-A6C34878D82A}">
+                    <a16:rowId xmlns:a16="http://schemas.microsoft.com/office/drawing/2014/main" val="3374278429"/>
+                  </a:ext>
+                </a:extLst>
+              </a:tr>
+              <a:tr h="434855">
+                <a:tc>
+                  <a:txBody>
+                    <a:bodyPr/>
+                    <a:lstStyle/>
+                    <a:p>
+                      <a:pPr marL="0" marR="0" algn="ctr">
+                        <a:lnSpc>
+                          <a:spcPct val="115000"/>
+                        </a:lnSpc>
+                        <a:spcBef>
+                          <a:spcPts val="0"/>
+                        </a:spcBef>
+                        <a:spcAft>
+                          <a:spcPts val="0"/>
+                        </a:spcAft>
+                      </a:pPr>
+                      <a:r>
+                        <a:rPr lang="en-US" sz="2400">
+                          <a:effectLst/>
+                        </a:rPr>
+                        <a:t>Paradise Palms</a:t>
+                      </a:r>
+                      <a:endParaRPr lang="en-US" sz="2400">
+                        <a:effectLst/>
+                        <a:latin typeface="Calibri" panose="020F0502020204030204" pitchFamily="34" charset="0"/>
+                        <a:ea typeface="Calibri" panose="020F0502020204030204" pitchFamily="34" charset="0"/>
+                        <a:cs typeface="Times New Roman" panose="02020603050405020304" pitchFamily="18" charset="0"/>
+                      </a:endParaRPr>
+                    </a:p>
+                  </a:txBody>
+                  <a:tcPr marL="68580" marR="68580" marT="0" marB="0" anchor="ctr"/>
+                </a:tc>
+                <a:tc>
+                  <a:txBody>
+                    <a:bodyPr/>
+                    <a:lstStyle/>
+                    <a:p>
+                      <a:pPr marL="0" marR="0" algn="ctr">
+                        <a:lnSpc>
+                          <a:spcPct val="115000"/>
+                        </a:lnSpc>
+                        <a:spcBef>
+                          <a:spcPts val="0"/>
+                        </a:spcBef>
+                        <a:spcAft>
+                          <a:spcPts val="0"/>
+                        </a:spcAft>
+                      </a:pPr>
+                      <a:r>
+                        <a:rPr lang="en-US" sz="2400" dirty="0">
+                          <a:effectLst/>
+                        </a:rPr>
+                        <a:t>0.08</a:t>
+                      </a:r>
+                      <a:endParaRPr lang="en-US" sz="2400" dirty="0">
+                        <a:effectLst/>
+                        <a:latin typeface="Calibri" panose="020F0502020204030204" pitchFamily="34" charset="0"/>
+                        <a:ea typeface="Calibri" panose="020F0502020204030204" pitchFamily="34" charset="0"/>
+                        <a:cs typeface="Times New Roman" panose="02020603050405020304" pitchFamily="18" charset="0"/>
+                      </a:endParaRPr>
+                    </a:p>
+                  </a:txBody>
+                  <a:tcPr marL="68580" marR="68580" marT="0" marB="0" anchor="ctr"/>
+                </a:tc>
+                <a:tc>
+                  <a:txBody>
+                    <a:bodyPr/>
+                    <a:lstStyle/>
+                    <a:p>
+                      <a:pPr marL="0" marR="0" algn="ctr">
+                        <a:lnSpc>
+                          <a:spcPct val="115000"/>
+                        </a:lnSpc>
+                        <a:spcBef>
+                          <a:spcPts val="0"/>
+                        </a:spcBef>
+                        <a:spcAft>
+                          <a:spcPts val="0"/>
+                        </a:spcAft>
+                      </a:pPr>
+                      <a:r>
+                        <a:rPr lang="en-US" sz="2400" dirty="0">
+                          <a:effectLst/>
+                        </a:rPr>
+                        <a:t>0.16</a:t>
+                      </a:r>
+                      <a:endParaRPr lang="en-US" sz="2400" dirty="0">
+                        <a:effectLst/>
+                        <a:latin typeface="Calibri" panose="020F0502020204030204" pitchFamily="34" charset="0"/>
+                        <a:ea typeface="Calibri" panose="020F0502020204030204" pitchFamily="34" charset="0"/>
+                        <a:cs typeface="Times New Roman" panose="02020603050405020304" pitchFamily="18" charset="0"/>
+                      </a:endParaRPr>
+                    </a:p>
+                  </a:txBody>
+                  <a:tcPr marL="68580" marR="68580" marT="0" marB="0" anchor="ctr"/>
                 </a:tc>
                 <a:tc>
                   <a:txBody>
@@ -20723,7 +21771,7 @@
                         <a:rPr lang="en-US" sz="2400">
                           <a:effectLst/>
                         </a:rPr>
-                        <a:t>0.58</a:t>
+                        <a:t>0.45</a:t>
                       </a:r>
                       <a:endParaRPr lang="en-US" sz="2400">
                         <a:effectLst/>
@@ -20733,15 +21781,15 @@
                       </a:endParaRPr>
                     </a:p>
                   </a:txBody>
-                  <a:tcPr marL="68580" marR="68580" marT="0" marB="0"/>
+                  <a:tcPr marL="68580" marR="68580" marT="0" marB="0" anchor="ctr"/>
                 </a:tc>
                 <a:extLst>
                   <a:ext uri="{0D108BD9-81ED-4DB2-BD59-A6C34878D82A}">
-                    <a16:rowId xmlns:a16="http://schemas.microsoft.com/office/drawing/2014/main" val="1615306822"/>
+                    <a16:rowId xmlns:a16="http://schemas.microsoft.com/office/drawing/2014/main" val="1163616175"/>
                   </a:ext>
                 </a:extLst>
               </a:tr>
-              <a:tr h="482090">
+              <a:tr h="406441">
                 <a:tc>
                   <a:txBody>
                     <a:bodyPr/>
@@ -20794,7 +21842,7 @@
                         <a:rPr lang="en-US" sz="2400">
                           <a:effectLst/>
                         </a:rPr>
-                        <a:t>0.05</a:t>
+                        <a:t>0.02</a:t>
                       </a:r>
                       <a:endParaRPr lang="en-US" sz="2400">
                         <a:effectLst/>
@@ -20826,7 +21874,7 @@
                         <a:rPr lang="en-US" sz="2400">
                           <a:effectLst/>
                         </a:rPr>
-                        <a:t>0.00</a:t>
+                        <a:t>0.07</a:t>
                       </a:r>
                       <a:endParaRPr lang="en-US" sz="2400">
                         <a:effectLst/>
@@ -20836,7 +21884,7 @@
                       </a:endParaRPr>
                     </a:p>
                   </a:txBody>
-                  <a:tcPr marL="68580" marR="68580" marT="0" marB="0"/>
+                  <a:tcPr marL="68580" marR="68580" marT="0" marB="0" anchor="ctr"/>
                 </a:tc>
                 <a:tc>
                   <a:txBody>
@@ -20858,7 +21906,7 @@
                         <a:rPr lang="en-US" sz="2400" dirty="0">
                           <a:effectLst/>
                         </a:rPr>
-                        <a:t>0.29</a:t>
+                        <a:t>0.22</a:t>
                       </a:r>
                       <a:endParaRPr lang="en-US" sz="2400" dirty="0">
                         <a:effectLst/>
@@ -20868,11 +21916,11 @@
                       </a:endParaRPr>
                     </a:p>
                   </a:txBody>
-                  <a:tcPr marL="68580" marR="68580" marT="0" marB="0"/>
+                  <a:tcPr marL="68580" marR="68580" marT="0" marB="0" anchor="ctr"/>
                 </a:tc>
                 <a:extLst>
                   <a:ext uri="{0D108BD9-81ED-4DB2-BD59-A6C34878D82A}">
-                    <a16:rowId xmlns:a16="http://schemas.microsoft.com/office/drawing/2014/main" val="3514827367"/>
+                    <a16:rowId xmlns:a16="http://schemas.microsoft.com/office/drawing/2014/main" val="3071081541"/>
                   </a:ext>
                 </a:extLst>
               </a:tr>
@@ -20880,41 +21928,6 @@
           </a:graphicData>
         </a:graphic>
       </p:graphicFrame>
-      <p:sp>
-        <p:nvSpPr>
-          <p:cNvPr id="2" name="TextBox 1">
-            <a:extLst>
-              <a:ext uri="{FF2B5EF4-FFF2-40B4-BE49-F238E27FC236}">
-                <a16:creationId xmlns:a16="http://schemas.microsoft.com/office/drawing/2014/main" id="{BED06FC3-1B13-4373-9732-38E574C5E9F3}"/>
-              </a:ext>
-            </a:extLst>
-          </p:cNvPr>
-          <p:cNvSpPr txBox="1"/>
-          <p:nvPr/>
-        </p:nvSpPr>
-        <p:spPr>
-          <a:xfrm>
-            <a:off x="1001486" y="4789714"/>
-            <a:ext cx="9557657" cy="1384995"/>
-          </a:xfrm>
-          <a:prstGeom prst="rect">
-            <a:avLst/>
-          </a:prstGeom>
-          <a:noFill/>
-        </p:spPr>
-        <p:txBody>
-          <a:bodyPr wrap="square" rtlCol="0">
-            <a:spAutoFit/>
-          </a:bodyPr>
-          <a:lstStyle/>
-          <a:p>
-            <a:r>
-              <a:rPr lang="en-US" sz="2800" dirty="0"/>
-              <a:t>What scenarios could we implement if we wanted to specifically test whether noise level or climate change had a greater impact on extinction risk?</a:t>
-            </a:r>
-          </a:p>
-        </p:txBody>
-      </p:sp>
     </p:spTree>
     <p:extLst>
       <p:ext uri="{BB962C8B-B14F-4D97-AF65-F5344CB8AC3E}">

</xml_diff>